<commit_message>
technical requirement english pptx
</commit_message>
<xml_diff>
--- a/Presentation/mkarta.uz Technical requirement presentation - eng.pptx
+++ b/Presentation/mkarta.uz Technical requirement presentation - eng.pptx
@@ -5,10 +5,17 @@
     <p:sldMasterId id="2147483648" r:id="rId1"/>
   </p:sldMasterIdLst>
   <p:sldIdLst>
-    <p:sldId id="256" r:id="rId2"/>
-    <p:sldId id="257" r:id="rId3"/>
-    <p:sldId id="258" r:id="rId4"/>
-    <p:sldId id="259" r:id="rId5"/>
+    <p:sldId id="258" r:id="rId2"/>
+    <p:sldId id="259" r:id="rId3"/>
+    <p:sldId id="266" r:id="rId4"/>
+    <p:sldId id="267" r:id="rId5"/>
+    <p:sldId id="261" r:id="rId6"/>
+    <p:sldId id="262" r:id="rId7"/>
+    <p:sldId id="268" r:id="rId8"/>
+    <p:sldId id="263" r:id="rId9"/>
+    <p:sldId id="264" r:id="rId10"/>
+    <p:sldId id="260" r:id="rId11"/>
+    <p:sldId id="265" r:id="rId12"/>
   </p:sldIdLst>
   <p:sldSz cx="12192000" cy="6858000"/>
   <p:notesSz cx="6858000" cy="9144000"/>
@@ -262,7 +269,7 @@
           <a:p>
             <a:fld id="{055FAE5C-355E-4A36-84AB-9279FAA04DDD}" type="datetimeFigureOut">
               <a:rPr lang="ru-RU" smtClean="0"/>
-              <a:t>19.02.2020</a:t>
+              <a:t>20.02.2020</a:t>
             </a:fld>
             <a:endParaRPr lang="ru-RU"/>
           </a:p>
@@ -460,7 +467,7 @@
           <a:p>
             <a:fld id="{055FAE5C-355E-4A36-84AB-9279FAA04DDD}" type="datetimeFigureOut">
               <a:rPr lang="ru-RU" smtClean="0"/>
-              <a:t>19.02.2020</a:t>
+              <a:t>20.02.2020</a:t>
             </a:fld>
             <a:endParaRPr lang="ru-RU"/>
           </a:p>
@@ -668,7 +675,7 @@
           <a:p>
             <a:fld id="{055FAE5C-355E-4A36-84AB-9279FAA04DDD}" type="datetimeFigureOut">
               <a:rPr lang="ru-RU" smtClean="0"/>
-              <a:t>19.02.2020</a:t>
+              <a:t>20.02.2020</a:t>
             </a:fld>
             <a:endParaRPr lang="ru-RU"/>
           </a:p>
@@ -866,7 +873,7 @@
           <a:p>
             <a:fld id="{055FAE5C-355E-4A36-84AB-9279FAA04DDD}" type="datetimeFigureOut">
               <a:rPr lang="ru-RU" smtClean="0"/>
-              <a:t>19.02.2020</a:t>
+              <a:t>20.02.2020</a:t>
             </a:fld>
             <a:endParaRPr lang="ru-RU"/>
           </a:p>
@@ -1141,7 +1148,7 @@
           <a:p>
             <a:fld id="{055FAE5C-355E-4A36-84AB-9279FAA04DDD}" type="datetimeFigureOut">
               <a:rPr lang="ru-RU" smtClean="0"/>
-              <a:t>19.02.2020</a:t>
+              <a:t>20.02.2020</a:t>
             </a:fld>
             <a:endParaRPr lang="ru-RU"/>
           </a:p>
@@ -1406,7 +1413,7 @@
           <a:p>
             <a:fld id="{055FAE5C-355E-4A36-84AB-9279FAA04DDD}" type="datetimeFigureOut">
               <a:rPr lang="ru-RU" smtClean="0"/>
-              <a:t>19.02.2020</a:t>
+              <a:t>20.02.2020</a:t>
             </a:fld>
             <a:endParaRPr lang="ru-RU"/>
           </a:p>
@@ -1818,7 +1825,7 @@
           <a:p>
             <a:fld id="{055FAE5C-355E-4A36-84AB-9279FAA04DDD}" type="datetimeFigureOut">
               <a:rPr lang="ru-RU" smtClean="0"/>
-              <a:t>19.02.2020</a:t>
+              <a:t>20.02.2020</a:t>
             </a:fld>
             <a:endParaRPr lang="ru-RU"/>
           </a:p>
@@ -1959,7 +1966,7 @@
           <a:p>
             <a:fld id="{055FAE5C-355E-4A36-84AB-9279FAA04DDD}" type="datetimeFigureOut">
               <a:rPr lang="ru-RU" smtClean="0"/>
-              <a:t>19.02.2020</a:t>
+              <a:t>20.02.2020</a:t>
             </a:fld>
             <a:endParaRPr lang="ru-RU"/>
           </a:p>
@@ -2072,7 +2079,7 @@
           <a:p>
             <a:fld id="{055FAE5C-355E-4A36-84AB-9279FAA04DDD}" type="datetimeFigureOut">
               <a:rPr lang="ru-RU" smtClean="0"/>
-              <a:t>19.02.2020</a:t>
+              <a:t>20.02.2020</a:t>
             </a:fld>
             <a:endParaRPr lang="ru-RU"/>
           </a:p>
@@ -2383,7 +2390,7 @@
           <a:p>
             <a:fld id="{055FAE5C-355E-4A36-84AB-9279FAA04DDD}" type="datetimeFigureOut">
               <a:rPr lang="ru-RU" smtClean="0"/>
-              <a:t>19.02.2020</a:t>
+              <a:t>20.02.2020</a:t>
             </a:fld>
             <a:endParaRPr lang="ru-RU"/>
           </a:p>
@@ -2671,7 +2678,7 @@
           <a:p>
             <a:fld id="{055FAE5C-355E-4A36-84AB-9279FAA04DDD}" type="datetimeFigureOut">
               <a:rPr lang="ru-RU" smtClean="0"/>
-              <a:t>19.02.2020</a:t>
+              <a:t>20.02.2020</a:t>
             </a:fld>
             <a:endParaRPr lang="ru-RU"/>
           </a:p>
@@ -2912,7 +2919,7 @@
           <a:p>
             <a:fld id="{055FAE5C-355E-4A36-84AB-9279FAA04DDD}" type="datetimeFigureOut">
               <a:rPr lang="ru-RU" smtClean="0"/>
-              <a:t>19.02.2020</a:t>
+              <a:t>20.02.2020</a:t>
             </a:fld>
             <a:endParaRPr lang="ru-RU"/>
           </a:p>
@@ -3345,7 +3352,12 @@
             <p:ph type="ctrTitle"/>
           </p:nvPr>
         </p:nvSpPr>
-        <p:spPr/>
+        <p:spPr>
+          <a:xfrm>
+            <a:off x="1524000" y="628721"/>
+            <a:ext cx="9144000" cy="971479"/>
+          </a:xfrm>
+        </p:spPr>
         <p:txBody>
           <a:bodyPr/>
           <a:lstStyle/>
@@ -3374,23 +3386,562 @@
             <p:ph type="subTitle" idx="1"/>
           </p:nvPr>
         </p:nvSpPr>
-        <p:spPr/>
+        <p:spPr>
+          <a:xfrm>
+            <a:off x="1524000" y="1638798"/>
+            <a:ext cx="9144000" cy="490253"/>
+          </a:xfrm>
+        </p:spPr>
         <p:txBody>
           <a:bodyPr/>
           <a:lstStyle/>
           <a:p>
             <a:r>
               <a:rPr lang="en-US" dirty="0"/>
-              <a:t>Technical requirement</a:t>
+              <a:t>technical task</a:t>
             </a:r>
             <a:endParaRPr lang="ru-RU" dirty="0"/>
           </a:p>
         </p:txBody>
       </p:sp>
+      <p:pic>
+        <p:nvPicPr>
+          <p:cNvPr id="5" name="image3.jpg">
+            <a:extLst>
+              <a:ext uri="{FF2B5EF4-FFF2-40B4-BE49-F238E27FC236}">
+                <a16:creationId xmlns:a16="http://schemas.microsoft.com/office/drawing/2014/main" id="{71D5E07B-0BF0-4495-8476-23AE9413D016}"/>
+              </a:ext>
+            </a:extLst>
+          </p:cNvPr>
+          <p:cNvPicPr/>
+          <p:nvPr/>
+        </p:nvPicPr>
+        <p:blipFill>
+          <a:blip r:embed="rId2"/>
+          <a:srcRect/>
+          <a:stretch>
+            <a:fillRect/>
+          </a:stretch>
+        </p:blipFill>
+        <p:spPr>
+          <a:xfrm>
+            <a:off x="2895031" y="2216151"/>
+            <a:ext cx="6401937" cy="4496274"/>
+          </a:xfrm>
+          <a:prstGeom prst="rect">
+            <a:avLst/>
+          </a:prstGeom>
+          <a:ln/>
+        </p:spPr>
+      </p:pic>
     </p:spTree>
     <p:extLst>
       <p:ext uri="{BB962C8B-B14F-4D97-AF65-F5344CB8AC3E}">
-        <p14:creationId xmlns:p14="http://schemas.microsoft.com/office/powerpoint/2010/main" val="656957483"/>
+        <p14:creationId xmlns:p14="http://schemas.microsoft.com/office/powerpoint/2010/main" val="1615180134"/>
+      </p:ext>
+    </p:extLst>
+  </p:cSld>
+  <p:clrMapOvr>
+    <a:masterClrMapping/>
+  </p:clrMapOvr>
+</p:sld>
+</file>
+
+<file path=ppt/slides/slide10.xml><?xml version="1.0" encoding="utf-8"?>
+<p:sld xmlns:a="http://schemas.openxmlformats.org/drawingml/2006/main" xmlns:r="http://schemas.openxmlformats.org/officeDocument/2006/relationships" xmlns:p="http://schemas.openxmlformats.org/presentationml/2006/main">
+  <p:cSld>
+    <p:spTree>
+      <p:nvGrpSpPr>
+        <p:cNvPr id="1" name=""/>
+        <p:cNvGrpSpPr/>
+        <p:nvPr/>
+      </p:nvGrpSpPr>
+      <p:grpSpPr>
+        <a:xfrm>
+          <a:off x="0" y="0"/>
+          <a:ext cx="0" cy="0"/>
+          <a:chOff x="0" y="0"/>
+          <a:chExt cx="0" cy="0"/>
+        </a:xfrm>
+      </p:grpSpPr>
+      <p:sp>
+        <p:nvSpPr>
+          <p:cNvPr id="2" name="Заголовок 1">
+            <a:extLst>
+              <a:ext uri="{FF2B5EF4-FFF2-40B4-BE49-F238E27FC236}">
+                <a16:creationId xmlns:a16="http://schemas.microsoft.com/office/drawing/2014/main" id="{E8EC30A4-2C32-4B9E-8F80-1A4ED40219EF}"/>
+              </a:ext>
+            </a:extLst>
+          </p:cNvPr>
+          <p:cNvSpPr>
+            <a:spLocks noGrp="1"/>
+          </p:cNvSpPr>
+          <p:nvPr>
+            <p:ph type="title"/>
+          </p:nvPr>
+        </p:nvSpPr>
+        <p:spPr>
+          <a:xfrm>
+            <a:off x="838200" y="365126"/>
+            <a:ext cx="10515600" cy="590218"/>
+          </a:xfrm>
+        </p:spPr>
+        <p:txBody>
+          <a:bodyPr>
+            <a:normAutofit fontScale="90000"/>
+          </a:bodyPr>
+          <a:lstStyle/>
+          <a:p>
+            <a:pPr algn="ctr"/>
+            <a:r>
+              <a:rPr lang="en-US" dirty="0"/>
+              <a:t>Users list</a:t>
+            </a:r>
+            <a:endParaRPr lang="ru-RU" dirty="0"/>
+          </a:p>
+        </p:txBody>
+      </p:sp>
+      <p:graphicFrame>
+        <p:nvGraphicFramePr>
+          <p:cNvPr id="4" name="Таблица 4">
+            <a:extLst>
+              <a:ext uri="{FF2B5EF4-FFF2-40B4-BE49-F238E27FC236}">
+                <a16:creationId xmlns:a16="http://schemas.microsoft.com/office/drawing/2014/main" id="{DA7BEEFE-1C71-4734-8067-0DA2535B221C}"/>
+              </a:ext>
+            </a:extLst>
+          </p:cNvPr>
+          <p:cNvGraphicFramePr>
+            <a:graphicFrameLocks noGrp="1"/>
+          </p:cNvGraphicFramePr>
+          <p:nvPr>
+            <p:extLst>
+              <p:ext uri="{D42A27DB-BD31-4B8C-83A1-F6EECF244321}">
+                <p14:modId xmlns:p14="http://schemas.microsoft.com/office/powerpoint/2010/main" val="1228171234"/>
+              </p:ext>
+            </p:extLst>
+          </p:nvPr>
+        </p:nvGraphicFramePr>
+        <p:xfrm>
+          <a:off x="2553648" y="1719618"/>
+          <a:ext cx="7084704" cy="1097280"/>
+        </p:xfrm>
+        <a:graphic>
+          <a:graphicData uri="http://schemas.openxmlformats.org/drawingml/2006/table">
+            <a:tbl>
+              <a:tblPr firstRow="1" bandRow="1">
+                <a:tableStyleId>{5C22544A-7EE6-4342-B048-85BDC9FD1C3A}</a:tableStyleId>
+              </a:tblPr>
+              <a:tblGrid>
+                <a:gridCol w="2361568">
+                  <a:extLst>
+                    <a:ext uri="{9D8B030D-6E8A-4147-A177-3AD203B41FA5}">
+                      <a16:colId xmlns:a16="http://schemas.microsoft.com/office/drawing/2014/main" val="2671108694"/>
+                    </a:ext>
+                  </a:extLst>
+                </a:gridCol>
+                <a:gridCol w="2361568">
+                  <a:extLst>
+                    <a:ext uri="{9D8B030D-6E8A-4147-A177-3AD203B41FA5}">
+                      <a16:colId xmlns:a16="http://schemas.microsoft.com/office/drawing/2014/main" val="3254547712"/>
+                    </a:ext>
+                  </a:extLst>
+                </a:gridCol>
+                <a:gridCol w="2361568">
+                  <a:extLst>
+                    <a:ext uri="{9D8B030D-6E8A-4147-A177-3AD203B41FA5}">
+                      <a16:colId xmlns:a16="http://schemas.microsoft.com/office/drawing/2014/main" val="2843107808"/>
+                    </a:ext>
+                  </a:extLst>
+                </a:gridCol>
+              </a:tblGrid>
+              <a:tr h="295109">
+                <a:tc>
+                  <a:txBody>
+                    <a:bodyPr/>
+                    <a:lstStyle/>
+                    <a:p>
+                      <a:r>
+                        <a:rPr lang="en-US" dirty="0"/>
+                        <a:t>Login</a:t>
+                      </a:r>
+                      <a:endParaRPr lang="ru-RU" dirty="0"/>
+                    </a:p>
+                  </a:txBody>
+                  <a:tcPr/>
+                </a:tc>
+                <a:tc>
+                  <a:txBody>
+                    <a:bodyPr/>
+                    <a:lstStyle/>
+                    <a:p>
+                      <a:r>
+                        <a:rPr lang="en-US" dirty="0"/>
+                        <a:t>email</a:t>
+                      </a:r>
+                      <a:endParaRPr lang="ru-RU" dirty="0"/>
+                    </a:p>
+                  </a:txBody>
+                  <a:tcPr/>
+                </a:tc>
+                <a:tc>
+                  <a:txBody>
+                    <a:bodyPr/>
+                    <a:lstStyle/>
+                    <a:p>
+                      <a:r>
+                        <a:rPr lang="en-US" dirty="0"/>
+                        <a:t>Year of birth</a:t>
+                      </a:r>
+                      <a:endParaRPr lang="ru-RU" dirty="0"/>
+                    </a:p>
+                  </a:txBody>
+                  <a:tcPr/>
+                </a:tc>
+                <a:extLst>
+                  <a:ext uri="{0D108BD9-81ED-4DB2-BD59-A6C34878D82A}">
+                    <a16:rowId xmlns:a16="http://schemas.microsoft.com/office/drawing/2014/main" val="3539756463"/>
+                  </a:ext>
+                </a:extLst>
+              </a:tr>
+              <a:tr h="355158">
+                <a:tc>
+                  <a:txBody>
+                    <a:bodyPr/>
+                    <a:lstStyle/>
+                    <a:p>
+                      <a:r>
+                        <a:rPr lang="en-US" dirty="0"/>
+                        <a:t>Ivanov</a:t>
+                      </a:r>
+                      <a:endParaRPr lang="ru-RU" dirty="0"/>
+                    </a:p>
+                  </a:txBody>
+                  <a:tcPr/>
+                </a:tc>
+                <a:tc>
+                  <a:txBody>
+                    <a:bodyPr/>
+                    <a:lstStyle/>
+                    <a:p>
+                      <a:r>
+                        <a:rPr lang="en-US" dirty="0">
+                          <a:hlinkClick r:id="rId2"/>
+                        </a:rPr>
+                        <a:t>Ivanov@gmail.com</a:t>
+                      </a:r>
+                      <a:endParaRPr lang="ru-RU" dirty="0"/>
+                    </a:p>
+                  </a:txBody>
+                  <a:tcPr/>
+                </a:tc>
+                <a:tc>
+                  <a:txBody>
+                    <a:bodyPr/>
+                    <a:lstStyle/>
+                    <a:p>
+                      <a:r>
+                        <a:rPr lang="en-US" dirty="0"/>
+                        <a:t>1980</a:t>
+                      </a:r>
+                      <a:endParaRPr lang="ru-RU" dirty="0"/>
+                    </a:p>
+                  </a:txBody>
+                  <a:tcPr/>
+                </a:tc>
+                <a:extLst>
+                  <a:ext uri="{0D108BD9-81ED-4DB2-BD59-A6C34878D82A}">
+                    <a16:rowId xmlns:a16="http://schemas.microsoft.com/office/drawing/2014/main" val="1594175319"/>
+                  </a:ext>
+                </a:extLst>
+              </a:tr>
+              <a:tr h="355158">
+                <a:tc>
+                  <a:txBody>
+                    <a:bodyPr/>
+                    <a:lstStyle/>
+                    <a:p>
+                      <a:r>
+                        <a:rPr lang="en-US" dirty="0"/>
+                        <a:t>James</a:t>
+                      </a:r>
+                      <a:endParaRPr lang="ru-RU" dirty="0"/>
+                    </a:p>
+                  </a:txBody>
+                  <a:tcPr/>
+                </a:tc>
+                <a:tc>
+                  <a:txBody>
+                    <a:bodyPr/>
+                    <a:lstStyle/>
+                    <a:p>
+                      <a:r>
+                        <a:rPr lang="en-US" dirty="0">
+                          <a:hlinkClick r:id="rId3"/>
+                        </a:rPr>
+                        <a:t>james@gmail.com</a:t>
+                      </a:r>
+                      <a:endParaRPr lang="ru-RU" dirty="0"/>
+                    </a:p>
+                  </a:txBody>
+                  <a:tcPr/>
+                </a:tc>
+                <a:tc>
+                  <a:txBody>
+                    <a:bodyPr/>
+                    <a:lstStyle/>
+                    <a:p>
+                      <a:r>
+                        <a:rPr lang="en-US" dirty="0"/>
+                        <a:t>1965</a:t>
+                      </a:r>
+                      <a:endParaRPr lang="ru-RU" dirty="0"/>
+                    </a:p>
+                  </a:txBody>
+                  <a:tcPr/>
+                </a:tc>
+                <a:extLst>
+                  <a:ext uri="{0D108BD9-81ED-4DB2-BD59-A6C34878D82A}">
+                    <a16:rowId xmlns:a16="http://schemas.microsoft.com/office/drawing/2014/main" val="251359142"/>
+                  </a:ext>
+                </a:extLst>
+              </a:tr>
+            </a:tbl>
+          </a:graphicData>
+        </a:graphic>
+      </p:graphicFrame>
+      <p:sp>
+        <p:nvSpPr>
+          <p:cNvPr id="6" name="Прямоугольник: скругленные углы 5">
+            <a:extLst>
+              <a:ext uri="{FF2B5EF4-FFF2-40B4-BE49-F238E27FC236}">
+                <a16:creationId xmlns:a16="http://schemas.microsoft.com/office/drawing/2014/main" id="{855C8A97-CB36-4DC0-AE96-1BCCBFAAE0B1}"/>
+              </a:ext>
+            </a:extLst>
+          </p:cNvPr>
+          <p:cNvSpPr/>
+          <p:nvPr/>
+        </p:nvSpPr>
+        <p:spPr>
+          <a:xfrm>
+            <a:off x="2947916" y="1296538"/>
+            <a:ext cx="2060812" cy="286603"/>
+          </a:xfrm>
+          <a:prstGeom prst="roundRect">
+            <a:avLst/>
+          </a:prstGeom>
+        </p:spPr>
+        <p:style>
+          <a:lnRef idx="2">
+            <a:schemeClr val="accent6"/>
+          </a:lnRef>
+          <a:fillRef idx="1">
+            <a:schemeClr val="lt1"/>
+          </a:fillRef>
+          <a:effectRef idx="0">
+            <a:schemeClr val="accent6"/>
+          </a:effectRef>
+          <a:fontRef idx="minor">
+            <a:schemeClr val="dk1"/>
+          </a:fontRef>
+        </p:style>
+        <p:txBody>
+          <a:bodyPr rtlCol="0" anchor="ctr"/>
+          <a:lstStyle/>
+          <a:p>
+            <a:pPr algn="ctr"/>
+            <a:endParaRPr lang="ru-RU" dirty="0"/>
+          </a:p>
+        </p:txBody>
+      </p:sp>
+      <p:sp>
+        <p:nvSpPr>
+          <p:cNvPr id="7" name="Прямоугольник: скругленные углы 6">
+            <a:extLst>
+              <a:ext uri="{FF2B5EF4-FFF2-40B4-BE49-F238E27FC236}">
+                <a16:creationId xmlns:a16="http://schemas.microsoft.com/office/drawing/2014/main" id="{1108B54E-5233-4E24-96DE-A0269DE5CE8D}"/>
+              </a:ext>
+            </a:extLst>
+          </p:cNvPr>
+          <p:cNvSpPr/>
+          <p:nvPr/>
+        </p:nvSpPr>
+        <p:spPr>
+          <a:xfrm>
+            <a:off x="5186149" y="1296538"/>
+            <a:ext cx="1473958" cy="286603"/>
+          </a:xfrm>
+          <a:prstGeom prst="roundRect">
+            <a:avLst/>
+          </a:prstGeom>
+        </p:spPr>
+        <p:style>
+          <a:lnRef idx="2">
+            <a:schemeClr val="dk1">
+              <a:shade val="50000"/>
+            </a:schemeClr>
+          </a:lnRef>
+          <a:fillRef idx="1">
+            <a:schemeClr val="dk1"/>
+          </a:fillRef>
+          <a:effectRef idx="0">
+            <a:schemeClr val="dk1"/>
+          </a:effectRef>
+          <a:fontRef idx="minor">
+            <a:schemeClr val="lt1"/>
+          </a:fontRef>
+        </p:style>
+        <p:txBody>
+          <a:bodyPr rtlCol="0" anchor="ctr"/>
+          <a:lstStyle/>
+          <a:p>
+            <a:pPr algn="ctr"/>
+            <a:r>
+              <a:rPr lang="en-US" dirty="0"/>
+              <a:t>Search</a:t>
+            </a:r>
+            <a:endParaRPr lang="ru-RU" dirty="0"/>
+          </a:p>
+        </p:txBody>
+      </p:sp>
+      <p:sp>
+        <p:nvSpPr>
+          <p:cNvPr id="10" name="TextBox 9">
+            <a:extLst>
+              <a:ext uri="{FF2B5EF4-FFF2-40B4-BE49-F238E27FC236}">
+                <a16:creationId xmlns:a16="http://schemas.microsoft.com/office/drawing/2014/main" id="{7E149485-00E5-443E-A46D-D969FF477346}"/>
+              </a:ext>
+            </a:extLst>
+          </p:cNvPr>
+          <p:cNvSpPr txBox="1"/>
+          <p:nvPr/>
+        </p:nvSpPr>
+        <p:spPr>
+          <a:xfrm>
+            <a:off x="1719618" y="3152632"/>
+            <a:ext cx="8952931" cy="369332"/>
+          </a:xfrm>
+          <a:prstGeom prst="rect">
+            <a:avLst/>
+          </a:prstGeom>
+          <a:noFill/>
+        </p:spPr>
+        <p:txBody>
+          <a:bodyPr wrap="square" rtlCol="0">
+            <a:spAutoFit/>
+          </a:bodyPr>
+          <a:lstStyle/>
+          <a:p>
+            <a:r>
+              <a:rPr lang="en-US" dirty="0"/>
+              <a:t>This table is visible only to doctors, and doctors will find the needed user.</a:t>
+            </a:r>
+            <a:endParaRPr lang="ru-RU" dirty="0"/>
+          </a:p>
+        </p:txBody>
+      </p:sp>
+    </p:spTree>
+    <p:extLst>
+      <p:ext uri="{BB962C8B-B14F-4D97-AF65-F5344CB8AC3E}">
+        <p14:creationId xmlns:p14="http://schemas.microsoft.com/office/powerpoint/2010/main" val="3847459169"/>
+      </p:ext>
+    </p:extLst>
+  </p:cSld>
+  <p:clrMapOvr>
+    <a:masterClrMapping/>
+  </p:clrMapOvr>
+</p:sld>
+</file>
+
+<file path=ppt/slides/slide11.xml><?xml version="1.0" encoding="utf-8"?>
+<p:sld xmlns:a="http://schemas.openxmlformats.org/drawingml/2006/main" xmlns:r="http://schemas.openxmlformats.org/officeDocument/2006/relationships" xmlns:p="http://schemas.openxmlformats.org/presentationml/2006/main">
+  <p:cSld>
+    <p:spTree>
+      <p:nvGrpSpPr>
+        <p:cNvPr id="1" name=""/>
+        <p:cNvGrpSpPr/>
+        <p:nvPr/>
+      </p:nvGrpSpPr>
+      <p:grpSpPr>
+        <a:xfrm>
+          <a:off x="0" y="0"/>
+          <a:ext cx="0" cy="0"/>
+          <a:chOff x="0" y="0"/>
+          <a:chExt cx="0" cy="0"/>
+        </a:xfrm>
+      </p:grpSpPr>
+      <p:sp>
+        <p:nvSpPr>
+          <p:cNvPr id="2" name="Заголовок 1">
+            <a:extLst>
+              <a:ext uri="{FF2B5EF4-FFF2-40B4-BE49-F238E27FC236}">
+                <a16:creationId xmlns:a16="http://schemas.microsoft.com/office/drawing/2014/main" id="{30E63649-6555-4028-836B-BAE379D5DEF8}"/>
+              </a:ext>
+            </a:extLst>
+          </p:cNvPr>
+          <p:cNvSpPr>
+            <a:spLocks noGrp="1"/>
+          </p:cNvSpPr>
+          <p:nvPr>
+            <p:ph type="title"/>
+          </p:nvPr>
+        </p:nvSpPr>
+        <p:spPr/>
+        <p:txBody>
+          <a:bodyPr/>
+          <a:lstStyle/>
+          <a:p>
+            <a:pPr algn="ctr"/>
+            <a:r>
+              <a:rPr lang="en-US" dirty="0"/>
+              <a:t>Sources of site revenue</a:t>
+            </a:r>
+            <a:endParaRPr lang="ru-RU" dirty="0"/>
+          </a:p>
+        </p:txBody>
+      </p:sp>
+      <p:sp>
+        <p:nvSpPr>
+          <p:cNvPr id="3" name="Объект 2">
+            <a:extLst>
+              <a:ext uri="{FF2B5EF4-FFF2-40B4-BE49-F238E27FC236}">
+                <a16:creationId xmlns:a16="http://schemas.microsoft.com/office/drawing/2014/main" id="{C1BFB3F5-A08B-4EE9-86DC-25F8FC916108}"/>
+              </a:ext>
+            </a:extLst>
+          </p:cNvPr>
+          <p:cNvSpPr>
+            <a:spLocks noGrp="1"/>
+          </p:cNvSpPr>
+          <p:nvPr>
+            <p:ph idx="1"/>
+          </p:nvPr>
+        </p:nvSpPr>
+        <p:spPr/>
+        <p:txBody>
+          <a:bodyPr/>
+          <a:lstStyle/>
+          <a:p>
+            <a:r>
+              <a:rPr lang="en-US" dirty="0"/>
+              <a:t>Advertising</a:t>
+            </a:r>
+            <a:r>
+              <a:rPr lang="uz-Cyrl-UZ" dirty="0"/>
+              <a:t>;</a:t>
+            </a:r>
+          </a:p>
+          <a:p>
+            <a:r>
+              <a:rPr lang="en-US" dirty="0"/>
+              <a:t>Due to the commission paid by users for the voluntary encouragement of doctors' recommendations.</a:t>
+            </a:r>
+            <a:endParaRPr lang="ru-RU" dirty="0"/>
+          </a:p>
+        </p:txBody>
+      </p:sp>
+    </p:spTree>
+    <p:extLst>
+      <p:ext uri="{BB962C8B-B14F-4D97-AF65-F5344CB8AC3E}">
+        <p14:creationId xmlns:p14="http://schemas.microsoft.com/office/powerpoint/2010/main" val="1852490662"/>
       </p:ext>
     </p:extLst>
   </p:cSld>
@@ -3438,47 +3989,52 @@
           <a:bodyPr/>
           <a:lstStyle/>
           <a:p>
+            <a:pPr algn="ctr"/>
+            <a:r>
+              <a:rPr lang="en-US" b="1" dirty="0"/>
+              <a:t>The purpose of the website mkarta.uz</a:t>
+            </a:r>
+            <a:endParaRPr lang="ru-RU" b="1" dirty="0"/>
+          </a:p>
+        </p:txBody>
+      </p:sp>
+      <p:sp>
+        <p:nvSpPr>
+          <p:cNvPr id="3" name="Объект 2">
+            <a:extLst>
+              <a:ext uri="{FF2B5EF4-FFF2-40B4-BE49-F238E27FC236}">
+                <a16:creationId xmlns:a16="http://schemas.microsoft.com/office/drawing/2014/main" id="{8859C80C-FC9D-440F-89FC-D3C43462C502}"/>
+              </a:ext>
+            </a:extLst>
+          </p:cNvPr>
+          <p:cNvSpPr>
+            <a:spLocks noGrp="1"/>
+          </p:cNvSpPr>
+          <p:nvPr>
+            <p:ph idx="1"/>
+          </p:nvPr>
+        </p:nvSpPr>
+        <p:spPr/>
+        <p:txBody>
+          <a:bodyPr/>
+          <a:lstStyle/>
+          <a:p>
             <a:r>
               <a:rPr lang="en-US" dirty="0"/>
-              <a:t>Purpose of web site mkarta.uz</a:t>
-            </a:r>
-            <a:endParaRPr lang="ru-RU" dirty="0"/>
-          </a:p>
-        </p:txBody>
-      </p:sp>
-      <p:sp>
-        <p:nvSpPr>
-          <p:cNvPr id="3" name="Объект 2">
-            <a:extLst>
-              <a:ext uri="{FF2B5EF4-FFF2-40B4-BE49-F238E27FC236}">
-                <a16:creationId xmlns:a16="http://schemas.microsoft.com/office/drawing/2014/main" id="{8859C80C-FC9D-440F-89FC-D3C43462C502}"/>
-              </a:ext>
-            </a:extLst>
-          </p:cNvPr>
-          <p:cNvSpPr>
-            <a:spLocks noGrp="1"/>
-          </p:cNvSpPr>
-          <p:nvPr>
-            <p:ph idx="1"/>
-          </p:nvPr>
-        </p:nvSpPr>
-        <p:spPr/>
-        <p:txBody>
-          <a:bodyPr/>
-          <a:lstStyle/>
+              <a:t>Keep user health information, diagnostic answers, treatment recommendations in one place;</a:t>
+            </a:r>
+          </a:p>
           <a:p>
             <a:r>
               <a:rPr lang="en-US" dirty="0"/>
-              <a:t>Keep user’s health information in one place</a:t>
-            </a:r>
-          </a:p>
-          <a:p>
-            <a:r>
-              <a:rPr lang="en-US"/>
-              <a:t>Creating conditions for doctors to provide users with referrals for diseases</a:t>
-            </a:r>
-          </a:p>
-          <a:p>
+              <a:t>Allows doctors to give advice on treatment or improving health;</a:t>
+            </a:r>
+          </a:p>
+          <a:p>
+            <a:r>
+              <a:rPr lang="en-US" dirty="0"/>
+              <a:t>Prepare reports on user health changes over time.</a:t>
+            </a:r>
             <a:endParaRPr lang="ru-RU" dirty="0"/>
           </a:p>
         </p:txBody>
@@ -3486,7 +4042,7 @@
     </p:spTree>
     <p:extLst>
       <p:ext uri="{BB962C8B-B14F-4D97-AF65-F5344CB8AC3E}">
-        <p14:creationId xmlns:p14="http://schemas.microsoft.com/office/powerpoint/2010/main" val="192235191"/>
+        <p14:creationId xmlns:p14="http://schemas.microsoft.com/office/powerpoint/2010/main" val="4139106129"/>
       </p:ext>
     </p:extLst>
   </p:cSld>
@@ -3518,7 +4074,7 @@
           <p:cNvPr id="2" name="Заголовок 1">
             <a:extLst>
               <a:ext uri="{FF2B5EF4-FFF2-40B4-BE49-F238E27FC236}">
-                <a16:creationId xmlns:a16="http://schemas.microsoft.com/office/drawing/2014/main" id="{0BC68E18-6C80-4B32-B380-85282986111C}"/>
+                <a16:creationId xmlns:a16="http://schemas.microsoft.com/office/drawing/2014/main" id="{281A1854-1034-49EA-88D5-D14E7097B530}"/>
               </a:ext>
             </a:extLst>
           </p:cNvPr>
@@ -3534,7 +4090,12 @@
           <a:bodyPr/>
           <a:lstStyle/>
           <a:p>
-            <a:endParaRPr lang="ru-RU"/>
+            <a:pPr algn="ctr"/>
+            <a:r>
+              <a:rPr lang="en-US" b="1" dirty="0"/>
+              <a:t>Information about software and hosting mkarta.uz</a:t>
+            </a:r>
+            <a:endParaRPr lang="ru-RU" b="1" dirty="0"/>
           </a:p>
         </p:txBody>
       </p:sp>
@@ -3543,7 +4104,7 @@
           <p:cNvPr id="3" name="Объект 2">
             <a:extLst>
               <a:ext uri="{FF2B5EF4-FFF2-40B4-BE49-F238E27FC236}">
-                <a16:creationId xmlns:a16="http://schemas.microsoft.com/office/drawing/2014/main" id="{5FAC8EE4-B254-45CA-A63C-913230B9307A}"/>
+                <a16:creationId xmlns:a16="http://schemas.microsoft.com/office/drawing/2014/main" id="{107ECFEE-5EE1-4108-826B-EDCB676BA63D}"/>
               </a:ext>
             </a:extLst>
           </p:cNvPr>
@@ -3559,65 +4120,38 @@
           <a:bodyPr/>
           <a:lstStyle/>
           <a:p>
-            <a:endParaRPr lang="ru-RU" dirty="0"/>
-          </a:p>
-        </p:txBody>
-      </p:sp>
-      <p:sp>
-        <p:nvSpPr>
-          <p:cNvPr id="4" name="Прямоугольник 3">
-            <a:hlinkClick r:id="rId2" action="ppaction://hlinksldjump"/>
-            <a:extLst>
-              <a:ext uri="{FF2B5EF4-FFF2-40B4-BE49-F238E27FC236}">
-                <a16:creationId xmlns:a16="http://schemas.microsoft.com/office/drawing/2014/main" id="{EEF568EA-E2D2-405A-989B-93DA31B8F8B0}"/>
-              </a:ext>
-            </a:extLst>
-          </p:cNvPr>
-          <p:cNvSpPr/>
-          <p:nvPr/>
-        </p:nvSpPr>
-        <p:spPr>
-          <a:xfrm>
-            <a:off x="8024884" y="2115403"/>
-            <a:ext cx="2306471" cy="614149"/>
-          </a:xfrm>
-          <a:prstGeom prst="rect">
-            <a:avLst/>
-          </a:prstGeom>
-        </p:spPr>
-        <p:style>
-          <a:lnRef idx="2">
-            <a:schemeClr val="accent1">
-              <a:shade val="50000"/>
-            </a:schemeClr>
-          </a:lnRef>
-          <a:fillRef idx="1">
-            <a:schemeClr val="accent1"/>
-          </a:fillRef>
-          <a:effectRef idx="0">
-            <a:schemeClr val="accent1"/>
-          </a:effectRef>
-          <a:fontRef idx="minor">
-            <a:schemeClr val="lt1"/>
-          </a:fontRef>
-        </p:style>
-        <p:txBody>
-          <a:bodyPr rtlCol="0" anchor="ctr"/>
-          <a:lstStyle/>
-          <a:p>
-            <a:pPr algn="ctr"/>
+            <a:r>
+              <a:rPr lang="en-US" dirty="0"/>
+              <a:t>The site is developed in the </a:t>
+            </a:r>
             <a:r>
               <a:rPr lang="en-US" dirty="0" err="1"/>
-              <a:t>fff</a:t>
-            </a:r>
-            <a:endParaRPr lang="ru-RU" dirty="0"/>
+              <a:t>joomla</a:t>
+            </a:r>
+            <a:r>
+              <a:rPr lang="en-US" dirty="0"/>
+              <a:t> CMS environment.</a:t>
+            </a:r>
+          </a:p>
+          <a:p>
+            <a:r>
+              <a:rPr lang="en-US" dirty="0"/>
+              <a:t>Program codes are fully located in the public repository https://github.com/ruslanbek05/mkarta.uz.git;</a:t>
+            </a:r>
+          </a:p>
+          <a:p>
+            <a:r>
+              <a:rPr lang="en-US" dirty="0"/>
+              <a:t>Hosting service from hostinger.com.</a:t>
+            </a:r>
+            <a:endParaRPr lang="uz-Cyrl-UZ" dirty="0"/>
           </a:p>
         </p:txBody>
       </p:sp>
     </p:spTree>
     <p:extLst>
       <p:ext uri="{BB962C8B-B14F-4D97-AF65-F5344CB8AC3E}">
-        <p14:creationId xmlns:p14="http://schemas.microsoft.com/office/powerpoint/2010/main" val="1298335381"/>
+        <p14:creationId xmlns:p14="http://schemas.microsoft.com/office/powerpoint/2010/main" val="2344836225"/>
       </p:ext>
     </p:extLst>
   </p:cSld>
@@ -3649,7 +4183,7 @@
           <p:cNvPr id="2" name="Заголовок 1">
             <a:extLst>
               <a:ext uri="{FF2B5EF4-FFF2-40B4-BE49-F238E27FC236}">
-                <a16:creationId xmlns:a16="http://schemas.microsoft.com/office/drawing/2014/main" id="{CCC72E0D-BF50-47D7-9E18-90434983156C}"/>
+                <a16:creationId xmlns:a16="http://schemas.microsoft.com/office/drawing/2014/main" id="{7304EBC6-B91D-48E0-9E77-F45CCEB4A35B}"/>
               </a:ext>
             </a:extLst>
           </p:cNvPr>
@@ -3665,43 +4199,2162 @@
           <a:bodyPr/>
           <a:lstStyle/>
           <a:p>
-            <a:r>
-              <a:rPr lang="en-US" dirty="0" err="1"/>
-              <a:t>aaaa</a:t>
+            <a:pPr algn="ctr"/>
+            <a:r>
+              <a:rPr lang="en-US" b="1" dirty="0"/>
+              <a:t>Confidentiality of information</a:t>
+            </a:r>
+            <a:endParaRPr lang="ru-RU" b="1" dirty="0"/>
+          </a:p>
+        </p:txBody>
+      </p:sp>
+      <p:sp>
+        <p:nvSpPr>
+          <p:cNvPr id="3" name="Объект 2">
+            <a:extLst>
+              <a:ext uri="{FF2B5EF4-FFF2-40B4-BE49-F238E27FC236}">
+                <a16:creationId xmlns:a16="http://schemas.microsoft.com/office/drawing/2014/main" id="{F53F37A9-06B4-4260-B5D4-689C914E8F99}"/>
+              </a:ext>
+            </a:extLst>
+          </p:cNvPr>
+          <p:cNvSpPr>
+            <a:spLocks noGrp="1"/>
+          </p:cNvSpPr>
+          <p:nvPr>
+            <p:ph idx="1"/>
+          </p:nvPr>
+        </p:nvSpPr>
+        <p:spPr/>
+        <p:txBody>
+          <a:bodyPr/>
+          <a:lstStyle/>
+          <a:p>
+            <a:r>
+              <a:rPr lang="en-US" dirty="0"/>
+              <a:t>User data is accessible only to the user and the doctors. Not visible to other users.</a:t>
+            </a:r>
+          </a:p>
+          <a:p>
+            <a:r>
+              <a:rPr lang="en-US" dirty="0"/>
+              <a:t>User’s can be added into the group of doctors only on the basis of the submitted documents.</a:t>
             </a:r>
             <a:endParaRPr lang="ru-RU" dirty="0"/>
-          </a:p>
-        </p:txBody>
-      </p:sp>
-      <p:sp>
-        <p:nvSpPr>
-          <p:cNvPr id="3" name="Объект 2">
-            <a:extLst>
-              <a:ext uri="{FF2B5EF4-FFF2-40B4-BE49-F238E27FC236}">
-                <a16:creationId xmlns:a16="http://schemas.microsoft.com/office/drawing/2014/main" id="{FAC5FC41-9E30-4F63-A24B-2A8438BA0222}"/>
-              </a:ext>
-            </a:extLst>
-          </p:cNvPr>
-          <p:cNvSpPr>
-            <a:spLocks noGrp="1"/>
-          </p:cNvSpPr>
-          <p:nvPr>
-            <p:ph idx="1"/>
-          </p:nvPr>
-        </p:nvSpPr>
-        <p:spPr/>
-        <p:txBody>
-          <a:bodyPr/>
-          <a:lstStyle/>
-          <a:p>
-            <a:endParaRPr lang="ru-RU"/>
           </a:p>
         </p:txBody>
       </p:sp>
     </p:spTree>
     <p:extLst>
       <p:ext uri="{BB962C8B-B14F-4D97-AF65-F5344CB8AC3E}">
-        <p14:creationId xmlns:p14="http://schemas.microsoft.com/office/powerpoint/2010/main" val="3493968931"/>
+        <p14:creationId xmlns:p14="http://schemas.microsoft.com/office/powerpoint/2010/main" val="954225659"/>
+      </p:ext>
+    </p:extLst>
+  </p:cSld>
+  <p:clrMapOvr>
+    <a:masterClrMapping/>
+  </p:clrMapOvr>
+</p:sld>
+</file>
+
+<file path=ppt/slides/slide5.xml><?xml version="1.0" encoding="utf-8"?>
+<p:sld xmlns:a="http://schemas.openxmlformats.org/drawingml/2006/main" xmlns:r="http://schemas.openxmlformats.org/officeDocument/2006/relationships" xmlns:p="http://schemas.openxmlformats.org/presentationml/2006/main">
+  <p:cSld>
+    <p:spTree>
+      <p:nvGrpSpPr>
+        <p:cNvPr id="1" name=""/>
+        <p:cNvGrpSpPr/>
+        <p:nvPr/>
+      </p:nvGrpSpPr>
+      <p:grpSpPr>
+        <a:xfrm>
+          <a:off x="0" y="0"/>
+          <a:ext cx="0" cy="0"/>
+          <a:chOff x="0" y="0"/>
+          <a:chExt cx="0" cy="0"/>
+        </a:xfrm>
+      </p:grpSpPr>
+      <p:sp>
+        <p:nvSpPr>
+          <p:cNvPr id="2" name="Заголовок 1">
+            <a:extLst>
+              <a:ext uri="{FF2B5EF4-FFF2-40B4-BE49-F238E27FC236}">
+                <a16:creationId xmlns:a16="http://schemas.microsoft.com/office/drawing/2014/main" id="{2FF5B0DF-5976-4475-8909-F0C1359DA68B}"/>
+              </a:ext>
+            </a:extLst>
+          </p:cNvPr>
+          <p:cNvSpPr>
+            <a:spLocks noGrp="1"/>
+          </p:cNvSpPr>
+          <p:nvPr>
+            <p:ph type="title"/>
+          </p:nvPr>
+        </p:nvSpPr>
+        <p:spPr/>
+        <p:txBody>
+          <a:bodyPr/>
+          <a:lstStyle/>
+          <a:p>
+            <a:pPr algn="ctr"/>
+            <a:r>
+              <a:rPr lang="en-US" dirty="0"/>
+              <a:t>Menu</a:t>
+            </a:r>
+            <a:r>
+              <a:rPr lang="uz-Cyrl-UZ" dirty="0"/>
+              <a:t> (</a:t>
+            </a:r>
+            <a:r>
+              <a:rPr lang="en-US" dirty="0"/>
+              <a:t>for users</a:t>
+            </a:r>
+            <a:r>
+              <a:rPr lang="uz-Cyrl-UZ" dirty="0"/>
+              <a:t>)</a:t>
+            </a:r>
+            <a:endParaRPr lang="ru-RU" dirty="0"/>
+          </a:p>
+        </p:txBody>
+      </p:sp>
+      <p:graphicFrame>
+        <p:nvGraphicFramePr>
+          <p:cNvPr id="4" name="Таблица 4">
+            <a:extLst>
+              <a:ext uri="{FF2B5EF4-FFF2-40B4-BE49-F238E27FC236}">
+                <a16:creationId xmlns:a16="http://schemas.microsoft.com/office/drawing/2014/main" id="{068F1E0F-891B-49A4-8288-331F18838ADC}"/>
+              </a:ext>
+            </a:extLst>
+          </p:cNvPr>
+          <p:cNvGraphicFramePr>
+            <a:graphicFrameLocks noGrp="1"/>
+          </p:cNvGraphicFramePr>
+          <p:nvPr>
+            <p:extLst>
+              <p:ext uri="{D42A27DB-BD31-4B8C-83A1-F6EECF244321}">
+                <p14:modId xmlns:p14="http://schemas.microsoft.com/office/powerpoint/2010/main" val="4234402088"/>
+              </p:ext>
+            </p:extLst>
+          </p:nvPr>
+        </p:nvGraphicFramePr>
+        <p:xfrm>
+          <a:off x="380619" y="1675406"/>
+          <a:ext cx="11206330" cy="2834640"/>
+        </p:xfrm>
+        <a:graphic>
+          <a:graphicData uri="http://schemas.openxmlformats.org/drawingml/2006/table">
+            <a:tbl>
+              <a:tblPr firstRow="1" bandRow="1">
+                <a:tableStyleId>{2D5ABB26-0587-4C30-8999-92F81FD0307C}</a:tableStyleId>
+              </a:tblPr>
+              <a:tblGrid>
+                <a:gridCol w="2567297">
+                  <a:extLst>
+                    <a:ext uri="{9D8B030D-6E8A-4147-A177-3AD203B41FA5}">
+                      <a16:colId xmlns:a16="http://schemas.microsoft.com/office/drawing/2014/main" val="324926100"/>
+                    </a:ext>
+                  </a:extLst>
+                </a:gridCol>
+                <a:gridCol w="8639033">
+                  <a:extLst>
+                    <a:ext uri="{9D8B030D-6E8A-4147-A177-3AD203B41FA5}">
+                      <a16:colId xmlns:a16="http://schemas.microsoft.com/office/drawing/2014/main" val="1749414321"/>
+                    </a:ext>
+                  </a:extLst>
+                </a:gridCol>
+              </a:tblGrid>
+              <a:tr h="308516">
+                <a:tc>
+                  <a:txBody>
+                    <a:bodyPr/>
+                    <a:lstStyle/>
+                    <a:p>
+                      <a:pPr algn="ctr"/>
+                      <a:r>
+                        <a:rPr lang="uz-Cyrl-UZ" b="1" dirty="0"/>
+                        <a:t>Меню</a:t>
+                      </a:r>
+                      <a:endParaRPr lang="ru-RU" b="1" dirty="0"/>
+                    </a:p>
+                  </a:txBody>
+                  <a:tcPr>
+                    <a:lnL w="12700" cap="flat" cmpd="sng" algn="ctr">
+                      <a:solidFill>
+                        <a:schemeClr val="tx1"/>
+                      </a:solidFill>
+                      <a:prstDash val="solid"/>
+                      <a:round/>
+                      <a:headEnd type="none" w="med" len="med"/>
+                      <a:tailEnd type="none" w="med" len="med"/>
+                    </a:lnL>
+                    <a:lnR w="12700" cap="flat" cmpd="sng" algn="ctr">
+                      <a:solidFill>
+                        <a:schemeClr val="tx1"/>
+                      </a:solidFill>
+                      <a:prstDash val="solid"/>
+                      <a:round/>
+                      <a:headEnd type="none" w="med" len="med"/>
+                      <a:tailEnd type="none" w="med" len="med"/>
+                    </a:lnR>
+                    <a:lnT w="12700" cap="flat" cmpd="sng" algn="ctr">
+                      <a:solidFill>
+                        <a:schemeClr val="tx1"/>
+                      </a:solidFill>
+                      <a:prstDash val="solid"/>
+                      <a:round/>
+                      <a:headEnd type="none" w="med" len="med"/>
+                      <a:tailEnd type="none" w="med" len="med"/>
+                    </a:lnT>
+                    <a:lnB w="12700" cap="flat" cmpd="sng" algn="ctr">
+                      <a:solidFill>
+                        <a:schemeClr val="tx1"/>
+                      </a:solidFill>
+                      <a:prstDash val="solid"/>
+                      <a:round/>
+                      <a:headEnd type="none" w="med" len="med"/>
+                      <a:tailEnd type="none" w="med" len="med"/>
+                    </a:lnB>
+                  </a:tcPr>
+                </a:tc>
+                <a:tc>
+                  <a:txBody>
+                    <a:bodyPr/>
+                    <a:lstStyle/>
+                    <a:p>
+                      <a:pPr algn="ctr"/>
+                      <a:r>
+                        <a:rPr lang="uz-Cyrl-UZ" b="1" dirty="0"/>
+                        <a:t>Изоҳ</a:t>
+                      </a:r>
+                      <a:endParaRPr lang="ru-RU" b="1" dirty="0"/>
+                    </a:p>
+                  </a:txBody>
+                  <a:tcPr>
+                    <a:lnL w="12700" cap="flat" cmpd="sng" algn="ctr">
+                      <a:solidFill>
+                        <a:schemeClr val="tx1"/>
+                      </a:solidFill>
+                      <a:prstDash val="solid"/>
+                      <a:round/>
+                      <a:headEnd type="none" w="med" len="med"/>
+                      <a:tailEnd type="none" w="med" len="med"/>
+                    </a:lnL>
+                    <a:lnR w="12700" cap="flat" cmpd="sng" algn="ctr">
+                      <a:solidFill>
+                        <a:schemeClr val="tx1"/>
+                      </a:solidFill>
+                      <a:prstDash val="solid"/>
+                      <a:round/>
+                      <a:headEnd type="none" w="med" len="med"/>
+                      <a:tailEnd type="none" w="med" len="med"/>
+                    </a:lnR>
+                    <a:lnT w="12700" cap="flat" cmpd="sng" algn="ctr">
+                      <a:solidFill>
+                        <a:schemeClr val="tx1"/>
+                      </a:solidFill>
+                      <a:prstDash val="solid"/>
+                      <a:round/>
+                      <a:headEnd type="none" w="med" len="med"/>
+                      <a:tailEnd type="none" w="med" len="med"/>
+                    </a:lnT>
+                    <a:lnB w="12700" cap="flat" cmpd="sng" algn="ctr">
+                      <a:solidFill>
+                        <a:schemeClr val="tx1"/>
+                      </a:solidFill>
+                      <a:prstDash val="solid"/>
+                      <a:round/>
+                      <a:headEnd type="none" w="med" len="med"/>
+                      <a:tailEnd type="none" w="med" len="med"/>
+                    </a:lnB>
+                  </a:tcPr>
+                </a:tc>
+                <a:extLst>
+                  <a:ext uri="{0D108BD9-81ED-4DB2-BD59-A6C34878D82A}">
+                    <a16:rowId xmlns:a16="http://schemas.microsoft.com/office/drawing/2014/main" val="1444431637"/>
+                  </a:ext>
+                </a:extLst>
+              </a:tr>
+              <a:tr h="308516">
+                <a:tc>
+                  <a:txBody>
+                    <a:bodyPr/>
+                    <a:lstStyle/>
+                    <a:p>
+                      <a:r>
+                        <a:rPr lang="en-US" dirty="0">
+                          <a:hlinkClick r:id="rId2" action="ppaction://hlinksldjump"/>
+                        </a:rPr>
+                        <a:t>Analyzes</a:t>
+                      </a:r>
+                      <a:r>
+                        <a:rPr lang="uz-Cyrl-UZ" dirty="0"/>
+                        <a:t> </a:t>
+                      </a:r>
+                      <a:endParaRPr lang="ru-RU" dirty="0"/>
+                    </a:p>
+                  </a:txBody>
+                  <a:tcPr>
+                    <a:lnL w="12700" cap="flat" cmpd="sng" algn="ctr">
+                      <a:solidFill>
+                        <a:schemeClr val="tx1"/>
+                      </a:solidFill>
+                      <a:prstDash val="solid"/>
+                      <a:round/>
+                      <a:headEnd type="none" w="med" len="med"/>
+                      <a:tailEnd type="none" w="med" len="med"/>
+                    </a:lnL>
+                    <a:lnR w="12700" cap="flat" cmpd="sng" algn="ctr">
+                      <a:solidFill>
+                        <a:schemeClr val="tx1"/>
+                      </a:solidFill>
+                      <a:prstDash val="solid"/>
+                      <a:round/>
+                      <a:headEnd type="none" w="med" len="med"/>
+                      <a:tailEnd type="none" w="med" len="med"/>
+                    </a:lnR>
+                    <a:lnT w="12700" cap="flat" cmpd="sng" algn="ctr">
+                      <a:solidFill>
+                        <a:schemeClr val="tx1"/>
+                      </a:solidFill>
+                      <a:prstDash val="solid"/>
+                      <a:round/>
+                      <a:headEnd type="none" w="med" len="med"/>
+                      <a:tailEnd type="none" w="med" len="med"/>
+                    </a:lnT>
+                    <a:lnB w="12700" cap="flat" cmpd="sng" algn="ctr">
+                      <a:solidFill>
+                        <a:schemeClr val="tx1"/>
+                      </a:solidFill>
+                      <a:prstDash val="solid"/>
+                      <a:round/>
+                      <a:headEnd type="none" w="med" len="med"/>
+                      <a:tailEnd type="none" w="med" len="med"/>
+                    </a:lnB>
+                  </a:tcPr>
+                </a:tc>
+                <a:tc>
+                  <a:txBody>
+                    <a:bodyPr/>
+                    <a:lstStyle/>
+                    <a:p>
+                      <a:r>
+                        <a:rPr lang="en-US" dirty="0"/>
+                        <a:t>Information about the user's health is entered (description, image, date)</a:t>
+                      </a:r>
+                      <a:endParaRPr lang="ru-RU" dirty="0"/>
+                    </a:p>
+                  </a:txBody>
+                  <a:tcPr>
+                    <a:lnL w="12700" cap="flat" cmpd="sng" algn="ctr">
+                      <a:solidFill>
+                        <a:schemeClr val="tx1"/>
+                      </a:solidFill>
+                      <a:prstDash val="solid"/>
+                      <a:round/>
+                      <a:headEnd type="none" w="med" len="med"/>
+                      <a:tailEnd type="none" w="med" len="med"/>
+                    </a:lnL>
+                    <a:lnR w="12700" cap="flat" cmpd="sng" algn="ctr">
+                      <a:solidFill>
+                        <a:schemeClr val="tx1"/>
+                      </a:solidFill>
+                      <a:prstDash val="solid"/>
+                      <a:round/>
+                      <a:headEnd type="none" w="med" len="med"/>
+                      <a:tailEnd type="none" w="med" len="med"/>
+                    </a:lnR>
+                    <a:lnT w="12700" cap="flat" cmpd="sng" algn="ctr">
+                      <a:solidFill>
+                        <a:schemeClr val="tx1"/>
+                      </a:solidFill>
+                      <a:prstDash val="solid"/>
+                      <a:round/>
+                      <a:headEnd type="none" w="med" len="med"/>
+                      <a:tailEnd type="none" w="med" len="med"/>
+                    </a:lnT>
+                    <a:lnB w="12700" cap="flat" cmpd="sng" algn="ctr">
+                      <a:solidFill>
+                        <a:schemeClr val="tx1"/>
+                      </a:solidFill>
+                      <a:prstDash val="solid"/>
+                      <a:round/>
+                      <a:headEnd type="none" w="med" len="med"/>
+                      <a:tailEnd type="none" w="med" len="med"/>
+                    </a:lnB>
+                  </a:tcPr>
+                </a:tc>
+                <a:extLst>
+                  <a:ext uri="{0D108BD9-81ED-4DB2-BD59-A6C34878D82A}">
+                    <a16:rowId xmlns:a16="http://schemas.microsoft.com/office/drawing/2014/main" val="113361725"/>
+                  </a:ext>
+                </a:extLst>
+              </a:tr>
+              <a:tr h="308516">
+                <a:tc>
+                  <a:txBody>
+                    <a:bodyPr/>
+                    <a:lstStyle/>
+                    <a:p>
+                      <a:r>
+                        <a:rPr lang="en-US" dirty="0"/>
+                        <a:t>Doctors Recommendations</a:t>
+                      </a:r>
+                      <a:endParaRPr lang="ru-RU" dirty="0"/>
+                    </a:p>
+                  </a:txBody>
+                  <a:tcPr>
+                    <a:lnL w="12700" cap="flat" cmpd="sng" algn="ctr">
+                      <a:solidFill>
+                        <a:schemeClr val="tx1"/>
+                      </a:solidFill>
+                      <a:prstDash val="solid"/>
+                      <a:round/>
+                      <a:headEnd type="none" w="med" len="med"/>
+                      <a:tailEnd type="none" w="med" len="med"/>
+                    </a:lnL>
+                    <a:lnR w="12700" cap="flat" cmpd="sng" algn="ctr">
+                      <a:solidFill>
+                        <a:schemeClr val="tx1"/>
+                      </a:solidFill>
+                      <a:prstDash val="solid"/>
+                      <a:round/>
+                      <a:headEnd type="none" w="med" len="med"/>
+                      <a:tailEnd type="none" w="med" len="med"/>
+                    </a:lnR>
+                    <a:lnT w="12700" cap="flat" cmpd="sng" algn="ctr">
+                      <a:solidFill>
+                        <a:schemeClr val="tx1"/>
+                      </a:solidFill>
+                      <a:prstDash val="solid"/>
+                      <a:round/>
+                      <a:headEnd type="none" w="med" len="med"/>
+                      <a:tailEnd type="none" w="med" len="med"/>
+                    </a:lnT>
+                    <a:lnB w="12700" cap="flat" cmpd="sng" algn="ctr">
+                      <a:solidFill>
+                        <a:schemeClr val="tx1"/>
+                      </a:solidFill>
+                      <a:prstDash val="solid"/>
+                      <a:round/>
+                      <a:headEnd type="none" w="med" len="med"/>
+                      <a:tailEnd type="none" w="med" len="med"/>
+                    </a:lnB>
+                  </a:tcPr>
+                </a:tc>
+                <a:tc>
+                  <a:txBody>
+                    <a:bodyPr/>
+                    <a:lstStyle/>
+                    <a:p>
+                      <a:endParaRPr lang="ru-RU" dirty="0"/>
+                    </a:p>
+                  </a:txBody>
+                  <a:tcPr>
+                    <a:lnL w="12700" cap="flat" cmpd="sng" algn="ctr">
+                      <a:solidFill>
+                        <a:schemeClr val="tx1"/>
+                      </a:solidFill>
+                      <a:prstDash val="solid"/>
+                      <a:round/>
+                      <a:headEnd type="none" w="med" len="med"/>
+                      <a:tailEnd type="none" w="med" len="med"/>
+                    </a:lnL>
+                    <a:lnR w="12700" cap="flat" cmpd="sng" algn="ctr">
+                      <a:solidFill>
+                        <a:schemeClr val="tx1"/>
+                      </a:solidFill>
+                      <a:prstDash val="solid"/>
+                      <a:round/>
+                      <a:headEnd type="none" w="med" len="med"/>
+                      <a:tailEnd type="none" w="med" len="med"/>
+                    </a:lnR>
+                    <a:lnT w="12700" cap="flat" cmpd="sng" algn="ctr">
+                      <a:solidFill>
+                        <a:schemeClr val="tx1"/>
+                      </a:solidFill>
+                      <a:prstDash val="solid"/>
+                      <a:round/>
+                      <a:headEnd type="none" w="med" len="med"/>
+                      <a:tailEnd type="none" w="med" len="med"/>
+                    </a:lnT>
+                    <a:lnB w="12700" cap="flat" cmpd="sng" algn="ctr">
+                      <a:solidFill>
+                        <a:schemeClr val="tx1"/>
+                      </a:solidFill>
+                      <a:prstDash val="solid"/>
+                      <a:round/>
+                      <a:headEnd type="none" w="med" len="med"/>
+                      <a:tailEnd type="none" w="med" len="med"/>
+                    </a:lnB>
+                  </a:tcPr>
+                </a:tc>
+                <a:extLst>
+                  <a:ext uri="{0D108BD9-81ED-4DB2-BD59-A6C34878D82A}">
+                    <a16:rowId xmlns:a16="http://schemas.microsoft.com/office/drawing/2014/main" val="2909321219"/>
+                  </a:ext>
+                </a:extLst>
+              </a:tr>
+              <a:tr h="308516">
+                <a:tc>
+                  <a:txBody>
+                    <a:bodyPr/>
+                    <a:lstStyle/>
+                    <a:p>
+                      <a:endParaRPr lang="ru-RU" dirty="0"/>
+                    </a:p>
+                  </a:txBody>
+                  <a:tcPr>
+                    <a:lnL w="12700" cap="flat" cmpd="sng" algn="ctr">
+                      <a:solidFill>
+                        <a:schemeClr val="tx1"/>
+                      </a:solidFill>
+                      <a:prstDash val="solid"/>
+                      <a:round/>
+                      <a:headEnd type="none" w="med" len="med"/>
+                      <a:tailEnd type="none" w="med" len="med"/>
+                    </a:lnL>
+                    <a:lnR w="12700" cap="flat" cmpd="sng" algn="ctr">
+                      <a:solidFill>
+                        <a:schemeClr val="tx1"/>
+                      </a:solidFill>
+                      <a:prstDash val="solid"/>
+                      <a:round/>
+                      <a:headEnd type="none" w="med" len="med"/>
+                      <a:tailEnd type="none" w="med" len="med"/>
+                    </a:lnR>
+                    <a:lnT w="12700" cap="flat" cmpd="sng" algn="ctr">
+                      <a:solidFill>
+                        <a:schemeClr val="tx1"/>
+                      </a:solidFill>
+                      <a:prstDash val="solid"/>
+                      <a:round/>
+                      <a:headEnd type="none" w="med" len="med"/>
+                      <a:tailEnd type="none" w="med" len="med"/>
+                    </a:lnT>
+                    <a:lnB w="12700" cap="flat" cmpd="sng" algn="ctr">
+                      <a:solidFill>
+                        <a:schemeClr val="tx1"/>
+                      </a:solidFill>
+                      <a:prstDash val="solid"/>
+                      <a:round/>
+                      <a:headEnd type="none" w="med" len="med"/>
+                      <a:tailEnd type="none" w="med" len="med"/>
+                    </a:lnB>
+                  </a:tcPr>
+                </a:tc>
+                <a:tc>
+                  <a:txBody>
+                    <a:bodyPr/>
+                    <a:lstStyle/>
+                    <a:p>
+                      <a:endParaRPr lang="ru-RU" dirty="0"/>
+                    </a:p>
+                  </a:txBody>
+                  <a:tcPr>
+                    <a:lnL w="12700" cap="flat" cmpd="sng" algn="ctr">
+                      <a:solidFill>
+                        <a:schemeClr val="tx1"/>
+                      </a:solidFill>
+                      <a:prstDash val="solid"/>
+                      <a:round/>
+                      <a:headEnd type="none" w="med" len="med"/>
+                      <a:tailEnd type="none" w="med" len="med"/>
+                    </a:lnL>
+                    <a:lnR w="12700" cap="flat" cmpd="sng" algn="ctr">
+                      <a:solidFill>
+                        <a:schemeClr val="tx1"/>
+                      </a:solidFill>
+                      <a:prstDash val="solid"/>
+                      <a:round/>
+                      <a:headEnd type="none" w="med" len="med"/>
+                      <a:tailEnd type="none" w="med" len="med"/>
+                    </a:lnR>
+                    <a:lnT w="12700" cap="flat" cmpd="sng" algn="ctr">
+                      <a:solidFill>
+                        <a:schemeClr val="tx1"/>
+                      </a:solidFill>
+                      <a:prstDash val="solid"/>
+                      <a:round/>
+                      <a:headEnd type="none" w="med" len="med"/>
+                      <a:tailEnd type="none" w="med" len="med"/>
+                    </a:lnT>
+                    <a:lnB w="12700" cap="flat" cmpd="sng" algn="ctr">
+                      <a:solidFill>
+                        <a:schemeClr val="tx1"/>
+                      </a:solidFill>
+                      <a:prstDash val="solid"/>
+                      <a:round/>
+                      <a:headEnd type="none" w="med" len="med"/>
+                      <a:tailEnd type="none" w="med" len="med"/>
+                    </a:lnB>
+                  </a:tcPr>
+                </a:tc>
+                <a:extLst>
+                  <a:ext uri="{0D108BD9-81ED-4DB2-BD59-A6C34878D82A}">
+                    <a16:rowId xmlns:a16="http://schemas.microsoft.com/office/drawing/2014/main" val="2807525101"/>
+                  </a:ext>
+                </a:extLst>
+              </a:tr>
+              <a:tr h="308516">
+                <a:tc>
+                  <a:txBody>
+                    <a:bodyPr/>
+                    <a:lstStyle/>
+                    <a:p>
+                      <a:endParaRPr lang="ru-RU" dirty="0"/>
+                    </a:p>
+                  </a:txBody>
+                  <a:tcPr>
+                    <a:lnL w="12700" cap="flat" cmpd="sng" algn="ctr">
+                      <a:solidFill>
+                        <a:schemeClr val="tx1"/>
+                      </a:solidFill>
+                      <a:prstDash val="solid"/>
+                      <a:round/>
+                      <a:headEnd type="none" w="med" len="med"/>
+                      <a:tailEnd type="none" w="med" len="med"/>
+                    </a:lnL>
+                    <a:lnR w="12700" cap="flat" cmpd="sng" algn="ctr">
+                      <a:solidFill>
+                        <a:schemeClr val="tx1"/>
+                      </a:solidFill>
+                      <a:prstDash val="solid"/>
+                      <a:round/>
+                      <a:headEnd type="none" w="med" len="med"/>
+                      <a:tailEnd type="none" w="med" len="med"/>
+                    </a:lnR>
+                    <a:lnT w="12700" cap="flat" cmpd="sng" algn="ctr">
+                      <a:solidFill>
+                        <a:schemeClr val="tx1"/>
+                      </a:solidFill>
+                      <a:prstDash val="solid"/>
+                      <a:round/>
+                      <a:headEnd type="none" w="med" len="med"/>
+                      <a:tailEnd type="none" w="med" len="med"/>
+                    </a:lnT>
+                    <a:lnB w="12700" cap="flat" cmpd="sng" algn="ctr">
+                      <a:solidFill>
+                        <a:schemeClr val="tx1"/>
+                      </a:solidFill>
+                      <a:prstDash val="solid"/>
+                      <a:round/>
+                      <a:headEnd type="none" w="med" len="med"/>
+                      <a:tailEnd type="none" w="med" len="med"/>
+                    </a:lnB>
+                  </a:tcPr>
+                </a:tc>
+                <a:tc>
+                  <a:txBody>
+                    <a:bodyPr/>
+                    <a:lstStyle/>
+                    <a:p>
+                      <a:endParaRPr lang="ru-RU" dirty="0"/>
+                    </a:p>
+                  </a:txBody>
+                  <a:tcPr>
+                    <a:lnL w="12700" cap="flat" cmpd="sng" algn="ctr">
+                      <a:solidFill>
+                        <a:schemeClr val="tx1"/>
+                      </a:solidFill>
+                      <a:prstDash val="solid"/>
+                      <a:round/>
+                      <a:headEnd type="none" w="med" len="med"/>
+                      <a:tailEnd type="none" w="med" len="med"/>
+                    </a:lnL>
+                    <a:lnR w="12700" cap="flat" cmpd="sng" algn="ctr">
+                      <a:solidFill>
+                        <a:schemeClr val="tx1"/>
+                      </a:solidFill>
+                      <a:prstDash val="solid"/>
+                      <a:round/>
+                      <a:headEnd type="none" w="med" len="med"/>
+                      <a:tailEnd type="none" w="med" len="med"/>
+                    </a:lnR>
+                    <a:lnT w="12700" cap="flat" cmpd="sng" algn="ctr">
+                      <a:solidFill>
+                        <a:schemeClr val="tx1"/>
+                      </a:solidFill>
+                      <a:prstDash val="solid"/>
+                      <a:round/>
+                      <a:headEnd type="none" w="med" len="med"/>
+                      <a:tailEnd type="none" w="med" len="med"/>
+                    </a:lnT>
+                    <a:lnB w="12700" cap="flat" cmpd="sng" algn="ctr">
+                      <a:solidFill>
+                        <a:schemeClr val="tx1"/>
+                      </a:solidFill>
+                      <a:prstDash val="solid"/>
+                      <a:round/>
+                      <a:headEnd type="none" w="med" len="med"/>
+                      <a:tailEnd type="none" w="med" len="med"/>
+                    </a:lnB>
+                  </a:tcPr>
+                </a:tc>
+                <a:extLst>
+                  <a:ext uri="{0D108BD9-81ED-4DB2-BD59-A6C34878D82A}">
+                    <a16:rowId xmlns:a16="http://schemas.microsoft.com/office/drawing/2014/main" val="2017660426"/>
+                  </a:ext>
+                </a:extLst>
+              </a:tr>
+              <a:tr h="308516">
+                <a:tc>
+                  <a:txBody>
+                    <a:bodyPr/>
+                    <a:lstStyle/>
+                    <a:p>
+                      <a:endParaRPr lang="ru-RU" dirty="0"/>
+                    </a:p>
+                  </a:txBody>
+                  <a:tcPr>
+                    <a:lnL w="12700" cap="flat" cmpd="sng" algn="ctr">
+                      <a:solidFill>
+                        <a:schemeClr val="tx1"/>
+                      </a:solidFill>
+                      <a:prstDash val="solid"/>
+                      <a:round/>
+                      <a:headEnd type="none" w="med" len="med"/>
+                      <a:tailEnd type="none" w="med" len="med"/>
+                    </a:lnL>
+                    <a:lnR w="12700" cap="flat" cmpd="sng" algn="ctr">
+                      <a:solidFill>
+                        <a:schemeClr val="tx1"/>
+                      </a:solidFill>
+                      <a:prstDash val="solid"/>
+                      <a:round/>
+                      <a:headEnd type="none" w="med" len="med"/>
+                      <a:tailEnd type="none" w="med" len="med"/>
+                    </a:lnR>
+                    <a:lnT w="12700" cap="flat" cmpd="sng" algn="ctr">
+                      <a:solidFill>
+                        <a:schemeClr val="tx1"/>
+                      </a:solidFill>
+                      <a:prstDash val="solid"/>
+                      <a:round/>
+                      <a:headEnd type="none" w="med" len="med"/>
+                      <a:tailEnd type="none" w="med" len="med"/>
+                    </a:lnT>
+                    <a:lnB w="12700" cap="flat" cmpd="sng" algn="ctr">
+                      <a:solidFill>
+                        <a:schemeClr val="tx1"/>
+                      </a:solidFill>
+                      <a:prstDash val="solid"/>
+                      <a:round/>
+                      <a:headEnd type="none" w="med" len="med"/>
+                      <a:tailEnd type="none" w="med" len="med"/>
+                    </a:lnB>
+                  </a:tcPr>
+                </a:tc>
+                <a:tc>
+                  <a:txBody>
+                    <a:bodyPr/>
+                    <a:lstStyle/>
+                    <a:p>
+                      <a:endParaRPr lang="ru-RU" dirty="0"/>
+                    </a:p>
+                  </a:txBody>
+                  <a:tcPr>
+                    <a:lnL w="12700" cap="flat" cmpd="sng" algn="ctr">
+                      <a:solidFill>
+                        <a:schemeClr val="tx1"/>
+                      </a:solidFill>
+                      <a:prstDash val="solid"/>
+                      <a:round/>
+                      <a:headEnd type="none" w="med" len="med"/>
+                      <a:tailEnd type="none" w="med" len="med"/>
+                    </a:lnL>
+                    <a:lnR w="12700" cap="flat" cmpd="sng" algn="ctr">
+                      <a:solidFill>
+                        <a:schemeClr val="tx1"/>
+                      </a:solidFill>
+                      <a:prstDash val="solid"/>
+                      <a:round/>
+                      <a:headEnd type="none" w="med" len="med"/>
+                      <a:tailEnd type="none" w="med" len="med"/>
+                    </a:lnR>
+                    <a:lnT w="12700" cap="flat" cmpd="sng" algn="ctr">
+                      <a:solidFill>
+                        <a:schemeClr val="tx1"/>
+                      </a:solidFill>
+                      <a:prstDash val="solid"/>
+                      <a:round/>
+                      <a:headEnd type="none" w="med" len="med"/>
+                      <a:tailEnd type="none" w="med" len="med"/>
+                    </a:lnT>
+                    <a:lnB w="12700" cap="flat" cmpd="sng" algn="ctr">
+                      <a:solidFill>
+                        <a:schemeClr val="tx1"/>
+                      </a:solidFill>
+                      <a:prstDash val="solid"/>
+                      <a:round/>
+                      <a:headEnd type="none" w="med" len="med"/>
+                      <a:tailEnd type="none" w="med" len="med"/>
+                    </a:lnB>
+                  </a:tcPr>
+                </a:tc>
+                <a:extLst>
+                  <a:ext uri="{0D108BD9-81ED-4DB2-BD59-A6C34878D82A}">
+                    <a16:rowId xmlns:a16="http://schemas.microsoft.com/office/drawing/2014/main" val="1534205009"/>
+                  </a:ext>
+                </a:extLst>
+              </a:tr>
+              <a:tr h="308516">
+                <a:tc>
+                  <a:txBody>
+                    <a:bodyPr/>
+                    <a:lstStyle/>
+                    <a:p>
+                      <a:endParaRPr lang="ru-RU" dirty="0"/>
+                    </a:p>
+                  </a:txBody>
+                  <a:tcPr>
+                    <a:lnL w="12700" cap="flat" cmpd="sng" algn="ctr">
+                      <a:solidFill>
+                        <a:schemeClr val="tx1"/>
+                      </a:solidFill>
+                      <a:prstDash val="solid"/>
+                      <a:round/>
+                      <a:headEnd type="none" w="med" len="med"/>
+                      <a:tailEnd type="none" w="med" len="med"/>
+                    </a:lnL>
+                    <a:lnR w="12700" cap="flat" cmpd="sng" algn="ctr">
+                      <a:solidFill>
+                        <a:schemeClr val="tx1"/>
+                      </a:solidFill>
+                      <a:prstDash val="solid"/>
+                      <a:round/>
+                      <a:headEnd type="none" w="med" len="med"/>
+                      <a:tailEnd type="none" w="med" len="med"/>
+                    </a:lnR>
+                    <a:lnT w="12700" cap="flat" cmpd="sng" algn="ctr">
+                      <a:solidFill>
+                        <a:schemeClr val="tx1"/>
+                      </a:solidFill>
+                      <a:prstDash val="solid"/>
+                      <a:round/>
+                      <a:headEnd type="none" w="med" len="med"/>
+                      <a:tailEnd type="none" w="med" len="med"/>
+                    </a:lnT>
+                    <a:lnB w="12700" cap="flat" cmpd="sng" algn="ctr">
+                      <a:solidFill>
+                        <a:schemeClr val="tx1"/>
+                      </a:solidFill>
+                      <a:prstDash val="solid"/>
+                      <a:round/>
+                      <a:headEnd type="none" w="med" len="med"/>
+                      <a:tailEnd type="none" w="med" len="med"/>
+                    </a:lnB>
+                  </a:tcPr>
+                </a:tc>
+                <a:tc>
+                  <a:txBody>
+                    <a:bodyPr/>
+                    <a:lstStyle/>
+                    <a:p>
+                      <a:endParaRPr lang="ru-RU" dirty="0"/>
+                    </a:p>
+                  </a:txBody>
+                  <a:tcPr>
+                    <a:lnL w="12700" cap="flat" cmpd="sng" algn="ctr">
+                      <a:solidFill>
+                        <a:schemeClr val="tx1"/>
+                      </a:solidFill>
+                      <a:prstDash val="solid"/>
+                      <a:round/>
+                      <a:headEnd type="none" w="med" len="med"/>
+                      <a:tailEnd type="none" w="med" len="med"/>
+                    </a:lnL>
+                    <a:lnR w="12700" cap="flat" cmpd="sng" algn="ctr">
+                      <a:solidFill>
+                        <a:schemeClr val="tx1"/>
+                      </a:solidFill>
+                      <a:prstDash val="solid"/>
+                      <a:round/>
+                      <a:headEnd type="none" w="med" len="med"/>
+                      <a:tailEnd type="none" w="med" len="med"/>
+                    </a:lnR>
+                    <a:lnT w="12700" cap="flat" cmpd="sng" algn="ctr">
+                      <a:solidFill>
+                        <a:schemeClr val="tx1"/>
+                      </a:solidFill>
+                      <a:prstDash val="solid"/>
+                      <a:round/>
+                      <a:headEnd type="none" w="med" len="med"/>
+                      <a:tailEnd type="none" w="med" len="med"/>
+                    </a:lnT>
+                    <a:lnB w="12700" cap="flat" cmpd="sng" algn="ctr">
+                      <a:solidFill>
+                        <a:schemeClr val="tx1"/>
+                      </a:solidFill>
+                      <a:prstDash val="solid"/>
+                      <a:round/>
+                      <a:headEnd type="none" w="med" len="med"/>
+                      <a:tailEnd type="none" w="med" len="med"/>
+                    </a:lnB>
+                  </a:tcPr>
+                </a:tc>
+                <a:extLst>
+                  <a:ext uri="{0D108BD9-81ED-4DB2-BD59-A6C34878D82A}">
+                    <a16:rowId xmlns:a16="http://schemas.microsoft.com/office/drawing/2014/main" val="255155417"/>
+                  </a:ext>
+                </a:extLst>
+              </a:tr>
+            </a:tbl>
+          </a:graphicData>
+        </a:graphic>
+      </p:graphicFrame>
+    </p:spTree>
+    <p:extLst>
+      <p:ext uri="{BB962C8B-B14F-4D97-AF65-F5344CB8AC3E}">
+        <p14:creationId xmlns:p14="http://schemas.microsoft.com/office/powerpoint/2010/main" val="2430902949"/>
+      </p:ext>
+    </p:extLst>
+  </p:cSld>
+  <p:clrMapOvr>
+    <a:masterClrMapping/>
+  </p:clrMapOvr>
+</p:sld>
+</file>
+
+<file path=ppt/slides/slide6.xml><?xml version="1.0" encoding="utf-8"?>
+<p:sld xmlns:a="http://schemas.openxmlformats.org/drawingml/2006/main" xmlns:r="http://schemas.openxmlformats.org/officeDocument/2006/relationships" xmlns:p="http://schemas.openxmlformats.org/presentationml/2006/main">
+  <p:cSld>
+    <p:spTree>
+      <p:nvGrpSpPr>
+        <p:cNvPr id="1" name=""/>
+        <p:cNvGrpSpPr/>
+        <p:nvPr/>
+      </p:nvGrpSpPr>
+      <p:grpSpPr>
+        <a:xfrm>
+          <a:off x="0" y="0"/>
+          <a:ext cx="0" cy="0"/>
+          <a:chOff x="0" y="0"/>
+          <a:chExt cx="0" cy="0"/>
+        </a:xfrm>
+      </p:grpSpPr>
+      <p:sp>
+        <p:nvSpPr>
+          <p:cNvPr id="2" name="Заголовок 1">
+            <a:extLst>
+              <a:ext uri="{FF2B5EF4-FFF2-40B4-BE49-F238E27FC236}">
+                <a16:creationId xmlns:a16="http://schemas.microsoft.com/office/drawing/2014/main" id="{2FF5B0DF-5976-4475-8909-F0C1359DA68B}"/>
+              </a:ext>
+            </a:extLst>
+          </p:cNvPr>
+          <p:cNvSpPr>
+            <a:spLocks noGrp="1"/>
+          </p:cNvSpPr>
+          <p:nvPr>
+            <p:ph type="title"/>
+          </p:nvPr>
+        </p:nvSpPr>
+        <p:spPr/>
+        <p:txBody>
+          <a:bodyPr/>
+          <a:lstStyle/>
+          <a:p>
+            <a:pPr algn="ctr"/>
+            <a:r>
+              <a:rPr lang="en-US" dirty="0"/>
+              <a:t>Menu(for doctors)</a:t>
+            </a:r>
+            <a:endParaRPr lang="ru-RU" dirty="0"/>
+          </a:p>
+        </p:txBody>
+      </p:sp>
+      <p:graphicFrame>
+        <p:nvGraphicFramePr>
+          <p:cNvPr id="4" name="Таблица 4">
+            <a:extLst>
+              <a:ext uri="{FF2B5EF4-FFF2-40B4-BE49-F238E27FC236}">
+                <a16:creationId xmlns:a16="http://schemas.microsoft.com/office/drawing/2014/main" id="{068F1E0F-891B-49A4-8288-331F18838ADC}"/>
+              </a:ext>
+            </a:extLst>
+          </p:cNvPr>
+          <p:cNvGraphicFramePr>
+            <a:graphicFrameLocks noGrp="1"/>
+          </p:cNvGraphicFramePr>
+          <p:nvPr>
+            <p:extLst>
+              <p:ext uri="{D42A27DB-BD31-4B8C-83A1-F6EECF244321}">
+                <p14:modId xmlns:p14="http://schemas.microsoft.com/office/powerpoint/2010/main" val="3569277760"/>
+              </p:ext>
+            </p:extLst>
+          </p:nvPr>
+        </p:nvGraphicFramePr>
+        <p:xfrm>
+          <a:off x="380619" y="1675406"/>
+          <a:ext cx="11206330" cy="3383280"/>
+        </p:xfrm>
+        <a:graphic>
+          <a:graphicData uri="http://schemas.openxmlformats.org/drawingml/2006/table">
+            <a:tbl>
+              <a:tblPr firstRow="1" bandRow="1">
+                <a:tableStyleId>{2D5ABB26-0587-4C30-8999-92F81FD0307C}</a:tableStyleId>
+              </a:tblPr>
+              <a:tblGrid>
+                <a:gridCol w="2567297">
+                  <a:extLst>
+                    <a:ext uri="{9D8B030D-6E8A-4147-A177-3AD203B41FA5}">
+                      <a16:colId xmlns:a16="http://schemas.microsoft.com/office/drawing/2014/main" val="324926100"/>
+                    </a:ext>
+                  </a:extLst>
+                </a:gridCol>
+                <a:gridCol w="8639033">
+                  <a:extLst>
+                    <a:ext uri="{9D8B030D-6E8A-4147-A177-3AD203B41FA5}">
+                      <a16:colId xmlns:a16="http://schemas.microsoft.com/office/drawing/2014/main" val="1749414321"/>
+                    </a:ext>
+                  </a:extLst>
+                </a:gridCol>
+              </a:tblGrid>
+              <a:tr h="308516">
+                <a:tc>
+                  <a:txBody>
+                    <a:bodyPr/>
+                    <a:lstStyle/>
+                    <a:p>
+                      <a:pPr algn="ctr"/>
+                      <a:r>
+                        <a:rPr lang="uz-Cyrl-UZ" b="1" dirty="0"/>
+                        <a:t>Меню</a:t>
+                      </a:r>
+                      <a:endParaRPr lang="ru-RU" b="1" dirty="0"/>
+                    </a:p>
+                  </a:txBody>
+                  <a:tcPr>
+                    <a:lnL w="12700" cap="flat" cmpd="sng" algn="ctr">
+                      <a:solidFill>
+                        <a:schemeClr val="tx1"/>
+                      </a:solidFill>
+                      <a:prstDash val="solid"/>
+                      <a:round/>
+                      <a:headEnd type="none" w="med" len="med"/>
+                      <a:tailEnd type="none" w="med" len="med"/>
+                    </a:lnL>
+                    <a:lnR w="12700" cap="flat" cmpd="sng" algn="ctr">
+                      <a:solidFill>
+                        <a:schemeClr val="tx1"/>
+                      </a:solidFill>
+                      <a:prstDash val="solid"/>
+                      <a:round/>
+                      <a:headEnd type="none" w="med" len="med"/>
+                      <a:tailEnd type="none" w="med" len="med"/>
+                    </a:lnR>
+                    <a:lnT w="12700" cap="flat" cmpd="sng" algn="ctr">
+                      <a:solidFill>
+                        <a:schemeClr val="tx1"/>
+                      </a:solidFill>
+                      <a:prstDash val="solid"/>
+                      <a:round/>
+                      <a:headEnd type="none" w="med" len="med"/>
+                      <a:tailEnd type="none" w="med" len="med"/>
+                    </a:lnT>
+                    <a:lnB w="12700" cap="flat" cmpd="sng" algn="ctr">
+                      <a:solidFill>
+                        <a:schemeClr val="tx1"/>
+                      </a:solidFill>
+                      <a:prstDash val="solid"/>
+                      <a:round/>
+                      <a:headEnd type="none" w="med" len="med"/>
+                      <a:tailEnd type="none" w="med" len="med"/>
+                    </a:lnB>
+                  </a:tcPr>
+                </a:tc>
+                <a:tc>
+                  <a:txBody>
+                    <a:bodyPr/>
+                    <a:lstStyle/>
+                    <a:p>
+                      <a:pPr algn="ctr"/>
+                      <a:r>
+                        <a:rPr lang="uz-Cyrl-UZ" b="1" dirty="0"/>
+                        <a:t>Изоҳ</a:t>
+                      </a:r>
+                      <a:endParaRPr lang="ru-RU" b="1" dirty="0"/>
+                    </a:p>
+                  </a:txBody>
+                  <a:tcPr>
+                    <a:lnL w="12700" cap="flat" cmpd="sng" algn="ctr">
+                      <a:solidFill>
+                        <a:schemeClr val="tx1"/>
+                      </a:solidFill>
+                      <a:prstDash val="solid"/>
+                      <a:round/>
+                      <a:headEnd type="none" w="med" len="med"/>
+                      <a:tailEnd type="none" w="med" len="med"/>
+                    </a:lnL>
+                    <a:lnR w="12700" cap="flat" cmpd="sng" algn="ctr">
+                      <a:solidFill>
+                        <a:schemeClr val="tx1"/>
+                      </a:solidFill>
+                      <a:prstDash val="solid"/>
+                      <a:round/>
+                      <a:headEnd type="none" w="med" len="med"/>
+                      <a:tailEnd type="none" w="med" len="med"/>
+                    </a:lnR>
+                    <a:lnT w="12700" cap="flat" cmpd="sng" algn="ctr">
+                      <a:solidFill>
+                        <a:schemeClr val="tx1"/>
+                      </a:solidFill>
+                      <a:prstDash val="solid"/>
+                      <a:round/>
+                      <a:headEnd type="none" w="med" len="med"/>
+                      <a:tailEnd type="none" w="med" len="med"/>
+                    </a:lnT>
+                    <a:lnB w="12700" cap="flat" cmpd="sng" algn="ctr">
+                      <a:solidFill>
+                        <a:schemeClr val="tx1"/>
+                      </a:solidFill>
+                      <a:prstDash val="solid"/>
+                      <a:round/>
+                      <a:headEnd type="none" w="med" len="med"/>
+                      <a:tailEnd type="none" w="med" len="med"/>
+                    </a:lnB>
+                  </a:tcPr>
+                </a:tc>
+                <a:extLst>
+                  <a:ext uri="{0D108BD9-81ED-4DB2-BD59-A6C34878D82A}">
+                    <a16:rowId xmlns:a16="http://schemas.microsoft.com/office/drawing/2014/main" val="1444431637"/>
+                  </a:ext>
+                </a:extLst>
+              </a:tr>
+              <a:tr h="308516">
+                <a:tc>
+                  <a:txBody>
+                    <a:bodyPr/>
+                    <a:lstStyle/>
+                    <a:p>
+                      <a:r>
+                        <a:rPr lang="en-US" dirty="0">
+                          <a:hlinkClick r:id="rId2" action="ppaction://hlinksldjump"/>
+                        </a:rPr>
+                        <a:t>Analyzes</a:t>
+                      </a:r>
+                      <a:r>
+                        <a:rPr lang="uz-Cyrl-UZ" dirty="0"/>
+                        <a:t> </a:t>
+                      </a:r>
+                      <a:endParaRPr lang="ru-RU" dirty="0"/>
+                    </a:p>
+                  </a:txBody>
+                  <a:tcPr>
+                    <a:lnL w="12700" cap="flat" cmpd="sng" algn="ctr">
+                      <a:solidFill>
+                        <a:schemeClr val="tx1"/>
+                      </a:solidFill>
+                      <a:prstDash val="solid"/>
+                      <a:round/>
+                      <a:headEnd type="none" w="med" len="med"/>
+                      <a:tailEnd type="none" w="med" len="med"/>
+                    </a:lnL>
+                    <a:lnR w="12700" cap="flat" cmpd="sng" algn="ctr">
+                      <a:solidFill>
+                        <a:schemeClr val="tx1"/>
+                      </a:solidFill>
+                      <a:prstDash val="solid"/>
+                      <a:round/>
+                      <a:headEnd type="none" w="med" len="med"/>
+                      <a:tailEnd type="none" w="med" len="med"/>
+                    </a:lnR>
+                    <a:lnT w="12700" cap="flat" cmpd="sng" algn="ctr">
+                      <a:solidFill>
+                        <a:schemeClr val="tx1"/>
+                      </a:solidFill>
+                      <a:prstDash val="solid"/>
+                      <a:round/>
+                      <a:headEnd type="none" w="med" len="med"/>
+                      <a:tailEnd type="none" w="med" len="med"/>
+                    </a:lnT>
+                    <a:lnB w="12700" cap="flat" cmpd="sng" algn="ctr">
+                      <a:solidFill>
+                        <a:schemeClr val="tx1"/>
+                      </a:solidFill>
+                      <a:prstDash val="solid"/>
+                      <a:round/>
+                      <a:headEnd type="none" w="med" len="med"/>
+                      <a:tailEnd type="none" w="med" len="med"/>
+                    </a:lnB>
+                  </a:tcPr>
+                </a:tc>
+                <a:tc>
+                  <a:txBody>
+                    <a:bodyPr/>
+                    <a:lstStyle/>
+                    <a:p>
+                      <a:r>
+                        <a:rPr lang="en-US" dirty="0"/>
+                        <a:t>Information about the user's health is entered (description, image, date)</a:t>
+                      </a:r>
+                      <a:endParaRPr lang="ru-RU" dirty="0"/>
+                    </a:p>
+                  </a:txBody>
+                  <a:tcPr>
+                    <a:lnL w="12700" cap="flat" cmpd="sng" algn="ctr">
+                      <a:solidFill>
+                        <a:schemeClr val="tx1"/>
+                      </a:solidFill>
+                      <a:prstDash val="solid"/>
+                      <a:round/>
+                      <a:headEnd type="none" w="med" len="med"/>
+                      <a:tailEnd type="none" w="med" len="med"/>
+                    </a:lnL>
+                    <a:lnR w="12700" cap="flat" cmpd="sng" algn="ctr">
+                      <a:solidFill>
+                        <a:schemeClr val="tx1"/>
+                      </a:solidFill>
+                      <a:prstDash val="solid"/>
+                      <a:round/>
+                      <a:headEnd type="none" w="med" len="med"/>
+                      <a:tailEnd type="none" w="med" len="med"/>
+                    </a:lnR>
+                    <a:lnT w="12700" cap="flat" cmpd="sng" algn="ctr">
+                      <a:solidFill>
+                        <a:schemeClr val="tx1"/>
+                      </a:solidFill>
+                      <a:prstDash val="solid"/>
+                      <a:round/>
+                      <a:headEnd type="none" w="med" len="med"/>
+                      <a:tailEnd type="none" w="med" len="med"/>
+                    </a:lnT>
+                    <a:lnB w="12700" cap="flat" cmpd="sng" algn="ctr">
+                      <a:solidFill>
+                        <a:schemeClr val="tx1"/>
+                      </a:solidFill>
+                      <a:prstDash val="solid"/>
+                      <a:round/>
+                      <a:headEnd type="none" w="med" len="med"/>
+                      <a:tailEnd type="none" w="med" len="med"/>
+                    </a:lnB>
+                  </a:tcPr>
+                </a:tc>
+                <a:extLst>
+                  <a:ext uri="{0D108BD9-81ED-4DB2-BD59-A6C34878D82A}">
+                    <a16:rowId xmlns:a16="http://schemas.microsoft.com/office/drawing/2014/main" val="113361725"/>
+                  </a:ext>
+                </a:extLst>
+              </a:tr>
+              <a:tr h="308516">
+                <a:tc>
+                  <a:txBody>
+                    <a:bodyPr/>
+                    <a:lstStyle/>
+                    <a:p>
+                      <a:r>
+                        <a:rPr lang="en-US" dirty="0"/>
+                        <a:t>Doctor Information</a:t>
+                      </a:r>
+                      <a:endParaRPr lang="ru-RU" dirty="0"/>
+                    </a:p>
+                  </a:txBody>
+                  <a:tcPr>
+                    <a:lnL w="12700" cap="flat" cmpd="sng" algn="ctr">
+                      <a:solidFill>
+                        <a:schemeClr val="tx1"/>
+                      </a:solidFill>
+                      <a:prstDash val="solid"/>
+                      <a:round/>
+                      <a:headEnd type="none" w="med" len="med"/>
+                      <a:tailEnd type="none" w="med" len="med"/>
+                    </a:lnL>
+                    <a:lnR w="12700" cap="flat" cmpd="sng" algn="ctr">
+                      <a:solidFill>
+                        <a:schemeClr val="tx1"/>
+                      </a:solidFill>
+                      <a:prstDash val="solid"/>
+                      <a:round/>
+                      <a:headEnd type="none" w="med" len="med"/>
+                      <a:tailEnd type="none" w="med" len="med"/>
+                    </a:lnR>
+                    <a:lnT w="12700" cap="flat" cmpd="sng" algn="ctr">
+                      <a:solidFill>
+                        <a:schemeClr val="tx1"/>
+                      </a:solidFill>
+                      <a:prstDash val="solid"/>
+                      <a:round/>
+                      <a:headEnd type="none" w="med" len="med"/>
+                      <a:tailEnd type="none" w="med" len="med"/>
+                    </a:lnT>
+                    <a:lnB w="12700" cap="flat" cmpd="sng" algn="ctr">
+                      <a:solidFill>
+                        <a:schemeClr val="tx1"/>
+                      </a:solidFill>
+                      <a:prstDash val="solid"/>
+                      <a:round/>
+                      <a:headEnd type="none" w="med" len="med"/>
+                      <a:tailEnd type="none" w="med" len="med"/>
+                    </a:lnB>
+                  </a:tcPr>
+                </a:tc>
+                <a:tc>
+                  <a:txBody>
+                    <a:bodyPr/>
+                    <a:lstStyle/>
+                    <a:p>
+                      <a:r>
+                        <a:rPr lang="en-US" dirty="0"/>
+                        <a:t>Here doctors upload documents confirming their doctorate. The site administrator adds the user to the group of doctors based on the uploaded documents. All users will have access to the doctor’s information.</a:t>
+                      </a:r>
+                      <a:endParaRPr lang="ru-RU" dirty="0"/>
+                    </a:p>
+                  </a:txBody>
+                  <a:tcPr>
+                    <a:lnL w="12700" cap="flat" cmpd="sng" algn="ctr">
+                      <a:solidFill>
+                        <a:schemeClr val="tx1"/>
+                      </a:solidFill>
+                      <a:prstDash val="solid"/>
+                      <a:round/>
+                      <a:headEnd type="none" w="med" len="med"/>
+                      <a:tailEnd type="none" w="med" len="med"/>
+                    </a:lnL>
+                    <a:lnR w="12700" cap="flat" cmpd="sng" algn="ctr">
+                      <a:solidFill>
+                        <a:schemeClr val="tx1"/>
+                      </a:solidFill>
+                      <a:prstDash val="solid"/>
+                      <a:round/>
+                      <a:headEnd type="none" w="med" len="med"/>
+                      <a:tailEnd type="none" w="med" len="med"/>
+                    </a:lnR>
+                    <a:lnT w="12700" cap="flat" cmpd="sng" algn="ctr">
+                      <a:solidFill>
+                        <a:schemeClr val="tx1"/>
+                      </a:solidFill>
+                      <a:prstDash val="solid"/>
+                      <a:round/>
+                      <a:headEnd type="none" w="med" len="med"/>
+                      <a:tailEnd type="none" w="med" len="med"/>
+                    </a:lnT>
+                    <a:lnB w="12700" cap="flat" cmpd="sng" algn="ctr">
+                      <a:solidFill>
+                        <a:schemeClr val="tx1"/>
+                      </a:solidFill>
+                      <a:prstDash val="solid"/>
+                      <a:round/>
+                      <a:headEnd type="none" w="med" len="med"/>
+                      <a:tailEnd type="none" w="med" len="med"/>
+                    </a:lnB>
+                  </a:tcPr>
+                </a:tc>
+                <a:extLst>
+                  <a:ext uri="{0D108BD9-81ED-4DB2-BD59-A6C34878D82A}">
+                    <a16:rowId xmlns:a16="http://schemas.microsoft.com/office/drawing/2014/main" val="2909321219"/>
+                  </a:ext>
+                </a:extLst>
+              </a:tr>
+              <a:tr h="308516">
+                <a:tc>
+                  <a:txBody>
+                    <a:bodyPr/>
+                    <a:lstStyle/>
+                    <a:p>
+                      <a:r>
+                        <a:rPr lang="en-US" dirty="0">
+                          <a:hlinkClick r:id="rId3" action="ppaction://hlinksldjump"/>
+                        </a:rPr>
+                        <a:t>Users list</a:t>
+                      </a:r>
+                      <a:endParaRPr lang="ru-RU" dirty="0"/>
+                    </a:p>
+                  </a:txBody>
+                  <a:tcPr>
+                    <a:lnL w="12700" cap="flat" cmpd="sng" algn="ctr">
+                      <a:solidFill>
+                        <a:schemeClr val="tx1"/>
+                      </a:solidFill>
+                      <a:prstDash val="solid"/>
+                      <a:round/>
+                      <a:headEnd type="none" w="med" len="med"/>
+                      <a:tailEnd type="none" w="med" len="med"/>
+                    </a:lnL>
+                    <a:lnR w="12700" cap="flat" cmpd="sng" algn="ctr">
+                      <a:solidFill>
+                        <a:schemeClr val="tx1"/>
+                      </a:solidFill>
+                      <a:prstDash val="solid"/>
+                      <a:round/>
+                      <a:headEnd type="none" w="med" len="med"/>
+                      <a:tailEnd type="none" w="med" len="med"/>
+                    </a:lnR>
+                    <a:lnT w="12700" cap="flat" cmpd="sng" algn="ctr">
+                      <a:solidFill>
+                        <a:schemeClr val="tx1"/>
+                      </a:solidFill>
+                      <a:prstDash val="solid"/>
+                      <a:round/>
+                      <a:headEnd type="none" w="med" len="med"/>
+                      <a:tailEnd type="none" w="med" len="med"/>
+                    </a:lnT>
+                    <a:lnB w="12700" cap="flat" cmpd="sng" algn="ctr">
+                      <a:solidFill>
+                        <a:schemeClr val="tx1"/>
+                      </a:solidFill>
+                      <a:prstDash val="solid"/>
+                      <a:round/>
+                      <a:headEnd type="none" w="med" len="med"/>
+                      <a:tailEnd type="none" w="med" len="med"/>
+                    </a:lnB>
+                  </a:tcPr>
+                </a:tc>
+                <a:tc>
+                  <a:txBody>
+                    <a:bodyPr/>
+                    <a:lstStyle/>
+                    <a:p>
+                      <a:r>
+                        <a:rPr lang="en-US" dirty="0"/>
+                        <a:t>From this list, the doctor will find the patient he needs.</a:t>
+                      </a:r>
+                      <a:endParaRPr lang="ru-RU" dirty="0"/>
+                    </a:p>
+                  </a:txBody>
+                  <a:tcPr>
+                    <a:lnL w="12700" cap="flat" cmpd="sng" algn="ctr">
+                      <a:solidFill>
+                        <a:schemeClr val="tx1"/>
+                      </a:solidFill>
+                      <a:prstDash val="solid"/>
+                      <a:round/>
+                      <a:headEnd type="none" w="med" len="med"/>
+                      <a:tailEnd type="none" w="med" len="med"/>
+                    </a:lnL>
+                    <a:lnR w="12700" cap="flat" cmpd="sng" algn="ctr">
+                      <a:solidFill>
+                        <a:schemeClr val="tx1"/>
+                      </a:solidFill>
+                      <a:prstDash val="solid"/>
+                      <a:round/>
+                      <a:headEnd type="none" w="med" len="med"/>
+                      <a:tailEnd type="none" w="med" len="med"/>
+                    </a:lnR>
+                    <a:lnT w="12700" cap="flat" cmpd="sng" algn="ctr">
+                      <a:solidFill>
+                        <a:schemeClr val="tx1"/>
+                      </a:solidFill>
+                      <a:prstDash val="solid"/>
+                      <a:round/>
+                      <a:headEnd type="none" w="med" len="med"/>
+                      <a:tailEnd type="none" w="med" len="med"/>
+                    </a:lnT>
+                    <a:lnB w="12700" cap="flat" cmpd="sng" algn="ctr">
+                      <a:solidFill>
+                        <a:schemeClr val="tx1"/>
+                      </a:solidFill>
+                      <a:prstDash val="solid"/>
+                      <a:round/>
+                      <a:headEnd type="none" w="med" len="med"/>
+                      <a:tailEnd type="none" w="med" len="med"/>
+                    </a:lnB>
+                  </a:tcPr>
+                </a:tc>
+                <a:extLst>
+                  <a:ext uri="{0D108BD9-81ED-4DB2-BD59-A6C34878D82A}">
+                    <a16:rowId xmlns:a16="http://schemas.microsoft.com/office/drawing/2014/main" val="2807525101"/>
+                  </a:ext>
+                </a:extLst>
+              </a:tr>
+              <a:tr h="308516">
+                <a:tc>
+                  <a:txBody>
+                    <a:bodyPr/>
+                    <a:lstStyle/>
+                    <a:p>
+                      <a:r>
+                        <a:rPr lang="en-US" dirty="0"/>
+                        <a:t>Doctors Recommendations</a:t>
+                      </a:r>
+                      <a:endParaRPr lang="ru-RU" dirty="0"/>
+                    </a:p>
+                  </a:txBody>
+                  <a:tcPr>
+                    <a:lnL w="12700" cap="flat" cmpd="sng" algn="ctr">
+                      <a:solidFill>
+                        <a:schemeClr val="tx1"/>
+                      </a:solidFill>
+                      <a:prstDash val="solid"/>
+                      <a:round/>
+                      <a:headEnd type="none" w="med" len="med"/>
+                      <a:tailEnd type="none" w="med" len="med"/>
+                    </a:lnL>
+                    <a:lnR w="12700" cap="flat" cmpd="sng" algn="ctr">
+                      <a:solidFill>
+                        <a:schemeClr val="tx1"/>
+                      </a:solidFill>
+                      <a:prstDash val="solid"/>
+                      <a:round/>
+                      <a:headEnd type="none" w="med" len="med"/>
+                      <a:tailEnd type="none" w="med" len="med"/>
+                    </a:lnR>
+                    <a:lnT w="12700" cap="flat" cmpd="sng" algn="ctr">
+                      <a:solidFill>
+                        <a:schemeClr val="tx1"/>
+                      </a:solidFill>
+                      <a:prstDash val="solid"/>
+                      <a:round/>
+                      <a:headEnd type="none" w="med" len="med"/>
+                      <a:tailEnd type="none" w="med" len="med"/>
+                    </a:lnT>
+                    <a:lnB w="12700" cap="flat" cmpd="sng" algn="ctr">
+                      <a:solidFill>
+                        <a:schemeClr val="tx1"/>
+                      </a:solidFill>
+                      <a:prstDash val="solid"/>
+                      <a:round/>
+                      <a:headEnd type="none" w="med" len="med"/>
+                      <a:tailEnd type="none" w="med" len="med"/>
+                    </a:lnB>
+                  </a:tcPr>
+                </a:tc>
+                <a:tc>
+                  <a:txBody>
+                    <a:bodyPr/>
+                    <a:lstStyle/>
+                    <a:p>
+                      <a:endParaRPr lang="ru-RU" dirty="0"/>
+                    </a:p>
+                  </a:txBody>
+                  <a:tcPr>
+                    <a:lnL w="12700" cap="flat" cmpd="sng" algn="ctr">
+                      <a:solidFill>
+                        <a:schemeClr val="tx1"/>
+                      </a:solidFill>
+                      <a:prstDash val="solid"/>
+                      <a:round/>
+                      <a:headEnd type="none" w="med" len="med"/>
+                      <a:tailEnd type="none" w="med" len="med"/>
+                    </a:lnL>
+                    <a:lnR w="12700" cap="flat" cmpd="sng" algn="ctr">
+                      <a:solidFill>
+                        <a:schemeClr val="tx1"/>
+                      </a:solidFill>
+                      <a:prstDash val="solid"/>
+                      <a:round/>
+                      <a:headEnd type="none" w="med" len="med"/>
+                      <a:tailEnd type="none" w="med" len="med"/>
+                    </a:lnR>
+                    <a:lnT w="12700" cap="flat" cmpd="sng" algn="ctr">
+                      <a:solidFill>
+                        <a:schemeClr val="tx1"/>
+                      </a:solidFill>
+                      <a:prstDash val="solid"/>
+                      <a:round/>
+                      <a:headEnd type="none" w="med" len="med"/>
+                      <a:tailEnd type="none" w="med" len="med"/>
+                    </a:lnT>
+                    <a:lnB w="12700" cap="flat" cmpd="sng" algn="ctr">
+                      <a:solidFill>
+                        <a:schemeClr val="tx1"/>
+                      </a:solidFill>
+                      <a:prstDash val="solid"/>
+                      <a:round/>
+                      <a:headEnd type="none" w="med" len="med"/>
+                      <a:tailEnd type="none" w="med" len="med"/>
+                    </a:lnB>
+                  </a:tcPr>
+                </a:tc>
+                <a:extLst>
+                  <a:ext uri="{0D108BD9-81ED-4DB2-BD59-A6C34878D82A}">
+                    <a16:rowId xmlns:a16="http://schemas.microsoft.com/office/drawing/2014/main" val="2017660426"/>
+                  </a:ext>
+                </a:extLst>
+              </a:tr>
+              <a:tr h="308516">
+                <a:tc>
+                  <a:txBody>
+                    <a:bodyPr/>
+                    <a:lstStyle/>
+                    <a:p>
+                      <a:endParaRPr lang="ru-RU" dirty="0"/>
+                    </a:p>
+                  </a:txBody>
+                  <a:tcPr>
+                    <a:lnL w="12700" cap="flat" cmpd="sng" algn="ctr">
+                      <a:solidFill>
+                        <a:schemeClr val="tx1"/>
+                      </a:solidFill>
+                      <a:prstDash val="solid"/>
+                      <a:round/>
+                      <a:headEnd type="none" w="med" len="med"/>
+                      <a:tailEnd type="none" w="med" len="med"/>
+                    </a:lnL>
+                    <a:lnR w="12700" cap="flat" cmpd="sng" algn="ctr">
+                      <a:solidFill>
+                        <a:schemeClr val="tx1"/>
+                      </a:solidFill>
+                      <a:prstDash val="solid"/>
+                      <a:round/>
+                      <a:headEnd type="none" w="med" len="med"/>
+                      <a:tailEnd type="none" w="med" len="med"/>
+                    </a:lnR>
+                    <a:lnT w="12700" cap="flat" cmpd="sng" algn="ctr">
+                      <a:solidFill>
+                        <a:schemeClr val="tx1"/>
+                      </a:solidFill>
+                      <a:prstDash val="solid"/>
+                      <a:round/>
+                      <a:headEnd type="none" w="med" len="med"/>
+                      <a:tailEnd type="none" w="med" len="med"/>
+                    </a:lnT>
+                    <a:lnB w="12700" cap="flat" cmpd="sng" algn="ctr">
+                      <a:solidFill>
+                        <a:schemeClr val="tx1"/>
+                      </a:solidFill>
+                      <a:prstDash val="solid"/>
+                      <a:round/>
+                      <a:headEnd type="none" w="med" len="med"/>
+                      <a:tailEnd type="none" w="med" len="med"/>
+                    </a:lnB>
+                  </a:tcPr>
+                </a:tc>
+                <a:tc>
+                  <a:txBody>
+                    <a:bodyPr/>
+                    <a:lstStyle/>
+                    <a:p>
+                      <a:endParaRPr lang="ru-RU" dirty="0"/>
+                    </a:p>
+                  </a:txBody>
+                  <a:tcPr>
+                    <a:lnL w="12700" cap="flat" cmpd="sng" algn="ctr">
+                      <a:solidFill>
+                        <a:schemeClr val="tx1"/>
+                      </a:solidFill>
+                      <a:prstDash val="solid"/>
+                      <a:round/>
+                      <a:headEnd type="none" w="med" len="med"/>
+                      <a:tailEnd type="none" w="med" len="med"/>
+                    </a:lnL>
+                    <a:lnR w="12700" cap="flat" cmpd="sng" algn="ctr">
+                      <a:solidFill>
+                        <a:schemeClr val="tx1"/>
+                      </a:solidFill>
+                      <a:prstDash val="solid"/>
+                      <a:round/>
+                      <a:headEnd type="none" w="med" len="med"/>
+                      <a:tailEnd type="none" w="med" len="med"/>
+                    </a:lnR>
+                    <a:lnT w="12700" cap="flat" cmpd="sng" algn="ctr">
+                      <a:solidFill>
+                        <a:schemeClr val="tx1"/>
+                      </a:solidFill>
+                      <a:prstDash val="solid"/>
+                      <a:round/>
+                      <a:headEnd type="none" w="med" len="med"/>
+                      <a:tailEnd type="none" w="med" len="med"/>
+                    </a:lnT>
+                    <a:lnB w="12700" cap="flat" cmpd="sng" algn="ctr">
+                      <a:solidFill>
+                        <a:schemeClr val="tx1"/>
+                      </a:solidFill>
+                      <a:prstDash val="solid"/>
+                      <a:round/>
+                      <a:headEnd type="none" w="med" len="med"/>
+                      <a:tailEnd type="none" w="med" len="med"/>
+                    </a:lnB>
+                  </a:tcPr>
+                </a:tc>
+                <a:extLst>
+                  <a:ext uri="{0D108BD9-81ED-4DB2-BD59-A6C34878D82A}">
+                    <a16:rowId xmlns:a16="http://schemas.microsoft.com/office/drawing/2014/main" val="1534205009"/>
+                  </a:ext>
+                </a:extLst>
+              </a:tr>
+              <a:tr h="308516">
+                <a:tc>
+                  <a:txBody>
+                    <a:bodyPr/>
+                    <a:lstStyle/>
+                    <a:p>
+                      <a:endParaRPr lang="ru-RU" dirty="0"/>
+                    </a:p>
+                  </a:txBody>
+                  <a:tcPr>
+                    <a:lnL w="12700" cap="flat" cmpd="sng" algn="ctr">
+                      <a:solidFill>
+                        <a:schemeClr val="tx1"/>
+                      </a:solidFill>
+                      <a:prstDash val="solid"/>
+                      <a:round/>
+                      <a:headEnd type="none" w="med" len="med"/>
+                      <a:tailEnd type="none" w="med" len="med"/>
+                    </a:lnL>
+                    <a:lnR w="12700" cap="flat" cmpd="sng" algn="ctr">
+                      <a:solidFill>
+                        <a:schemeClr val="tx1"/>
+                      </a:solidFill>
+                      <a:prstDash val="solid"/>
+                      <a:round/>
+                      <a:headEnd type="none" w="med" len="med"/>
+                      <a:tailEnd type="none" w="med" len="med"/>
+                    </a:lnR>
+                    <a:lnT w="12700" cap="flat" cmpd="sng" algn="ctr">
+                      <a:solidFill>
+                        <a:schemeClr val="tx1"/>
+                      </a:solidFill>
+                      <a:prstDash val="solid"/>
+                      <a:round/>
+                      <a:headEnd type="none" w="med" len="med"/>
+                      <a:tailEnd type="none" w="med" len="med"/>
+                    </a:lnT>
+                    <a:lnB w="12700" cap="flat" cmpd="sng" algn="ctr">
+                      <a:solidFill>
+                        <a:schemeClr val="tx1"/>
+                      </a:solidFill>
+                      <a:prstDash val="solid"/>
+                      <a:round/>
+                      <a:headEnd type="none" w="med" len="med"/>
+                      <a:tailEnd type="none" w="med" len="med"/>
+                    </a:lnB>
+                  </a:tcPr>
+                </a:tc>
+                <a:tc>
+                  <a:txBody>
+                    <a:bodyPr/>
+                    <a:lstStyle/>
+                    <a:p>
+                      <a:endParaRPr lang="ru-RU" dirty="0"/>
+                    </a:p>
+                  </a:txBody>
+                  <a:tcPr>
+                    <a:lnL w="12700" cap="flat" cmpd="sng" algn="ctr">
+                      <a:solidFill>
+                        <a:schemeClr val="tx1"/>
+                      </a:solidFill>
+                      <a:prstDash val="solid"/>
+                      <a:round/>
+                      <a:headEnd type="none" w="med" len="med"/>
+                      <a:tailEnd type="none" w="med" len="med"/>
+                    </a:lnL>
+                    <a:lnR w="12700" cap="flat" cmpd="sng" algn="ctr">
+                      <a:solidFill>
+                        <a:schemeClr val="tx1"/>
+                      </a:solidFill>
+                      <a:prstDash val="solid"/>
+                      <a:round/>
+                      <a:headEnd type="none" w="med" len="med"/>
+                      <a:tailEnd type="none" w="med" len="med"/>
+                    </a:lnR>
+                    <a:lnT w="12700" cap="flat" cmpd="sng" algn="ctr">
+                      <a:solidFill>
+                        <a:schemeClr val="tx1"/>
+                      </a:solidFill>
+                      <a:prstDash val="solid"/>
+                      <a:round/>
+                      <a:headEnd type="none" w="med" len="med"/>
+                      <a:tailEnd type="none" w="med" len="med"/>
+                    </a:lnT>
+                    <a:lnB w="12700" cap="flat" cmpd="sng" algn="ctr">
+                      <a:solidFill>
+                        <a:schemeClr val="tx1"/>
+                      </a:solidFill>
+                      <a:prstDash val="solid"/>
+                      <a:round/>
+                      <a:headEnd type="none" w="med" len="med"/>
+                      <a:tailEnd type="none" w="med" len="med"/>
+                    </a:lnB>
+                  </a:tcPr>
+                </a:tc>
+                <a:extLst>
+                  <a:ext uri="{0D108BD9-81ED-4DB2-BD59-A6C34878D82A}">
+                    <a16:rowId xmlns:a16="http://schemas.microsoft.com/office/drawing/2014/main" val="255155417"/>
+                  </a:ext>
+                </a:extLst>
+              </a:tr>
+            </a:tbl>
+          </a:graphicData>
+        </a:graphic>
+      </p:graphicFrame>
+    </p:spTree>
+    <p:extLst>
+      <p:ext uri="{BB962C8B-B14F-4D97-AF65-F5344CB8AC3E}">
+        <p14:creationId xmlns:p14="http://schemas.microsoft.com/office/powerpoint/2010/main" val="2328221012"/>
+      </p:ext>
+    </p:extLst>
+  </p:cSld>
+  <p:clrMapOvr>
+    <a:masterClrMapping/>
+  </p:clrMapOvr>
+</p:sld>
+</file>
+
+<file path=ppt/slides/slide7.xml><?xml version="1.0" encoding="utf-8"?>
+<p:sld xmlns:a="http://schemas.openxmlformats.org/drawingml/2006/main" xmlns:r="http://schemas.openxmlformats.org/officeDocument/2006/relationships" xmlns:p="http://schemas.openxmlformats.org/presentationml/2006/main">
+  <p:cSld>
+    <p:spTree>
+      <p:nvGrpSpPr>
+        <p:cNvPr id="1" name=""/>
+        <p:cNvGrpSpPr/>
+        <p:nvPr/>
+      </p:nvGrpSpPr>
+      <p:grpSpPr>
+        <a:xfrm>
+          <a:off x="0" y="0"/>
+          <a:ext cx="0" cy="0"/>
+          <a:chOff x="0" y="0"/>
+          <a:chExt cx="0" cy="0"/>
+        </a:xfrm>
+      </p:grpSpPr>
+      <p:sp>
+        <p:nvSpPr>
+          <p:cNvPr id="2" name="Заголовок 1">
+            <a:extLst>
+              <a:ext uri="{FF2B5EF4-FFF2-40B4-BE49-F238E27FC236}">
+                <a16:creationId xmlns:a16="http://schemas.microsoft.com/office/drawing/2014/main" id="{058A5A7C-9C97-45EB-85CA-46980178478F}"/>
+              </a:ext>
+            </a:extLst>
+          </p:cNvPr>
+          <p:cNvSpPr>
+            <a:spLocks noGrp="1"/>
+          </p:cNvSpPr>
+          <p:nvPr>
+            <p:ph type="title"/>
+          </p:nvPr>
+        </p:nvSpPr>
+        <p:spPr/>
+        <p:txBody>
+          <a:bodyPr/>
+          <a:lstStyle/>
+          <a:p>
+            <a:r>
+              <a:rPr lang="en-US" dirty="0"/>
+              <a:t>Health Information Entry Form</a:t>
+            </a:r>
+            <a:endParaRPr lang="ru-RU" dirty="0"/>
+          </a:p>
+        </p:txBody>
+      </p:sp>
+      <p:pic>
+        <p:nvPicPr>
+          <p:cNvPr id="3" name="Рисунок 2">
+            <a:extLst>
+              <a:ext uri="{FF2B5EF4-FFF2-40B4-BE49-F238E27FC236}">
+                <a16:creationId xmlns:a16="http://schemas.microsoft.com/office/drawing/2014/main" id="{8159F52F-49E2-4BAF-8848-94B2FEA75094}"/>
+              </a:ext>
+            </a:extLst>
+          </p:cNvPr>
+          <p:cNvPicPr>
+            <a:picLocks noChangeAspect="1"/>
+          </p:cNvPicPr>
+          <p:nvPr/>
+        </p:nvPicPr>
+        <p:blipFill>
+          <a:blip r:embed="rId2"/>
+          <a:stretch>
+            <a:fillRect/>
+          </a:stretch>
+        </p:blipFill>
+        <p:spPr>
+          <a:xfrm>
+            <a:off x="2089316" y="1690688"/>
+            <a:ext cx="8013368" cy="4899002"/>
+          </a:xfrm>
+          <a:prstGeom prst="rect">
+            <a:avLst/>
+          </a:prstGeom>
+        </p:spPr>
+      </p:pic>
+    </p:spTree>
+    <p:extLst>
+      <p:ext uri="{BB962C8B-B14F-4D97-AF65-F5344CB8AC3E}">
+        <p14:creationId xmlns:p14="http://schemas.microsoft.com/office/powerpoint/2010/main" val="2357113918"/>
+      </p:ext>
+    </p:extLst>
+  </p:cSld>
+  <p:clrMapOvr>
+    <a:masterClrMapping/>
+  </p:clrMapOvr>
+</p:sld>
+</file>
+
+<file path=ppt/slides/slide8.xml><?xml version="1.0" encoding="utf-8"?>
+<p:sld xmlns:a="http://schemas.openxmlformats.org/drawingml/2006/main" xmlns:r="http://schemas.openxmlformats.org/officeDocument/2006/relationships" xmlns:p="http://schemas.openxmlformats.org/presentationml/2006/main">
+  <p:cSld>
+    <p:spTree>
+      <p:nvGrpSpPr>
+        <p:cNvPr id="1" name=""/>
+        <p:cNvGrpSpPr/>
+        <p:nvPr/>
+      </p:nvGrpSpPr>
+      <p:grpSpPr>
+        <a:xfrm>
+          <a:off x="0" y="0"/>
+          <a:ext cx="0" cy="0"/>
+          <a:chOff x="0" y="0"/>
+          <a:chExt cx="0" cy="0"/>
+        </a:xfrm>
+      </p:grpSpPr>
+      <p:sp>
+        <p:nvSpPr>
+          <p:cNvPr id="2" name="Заголовок 1">
+            <a:extLst>
+              <a:ext uri="{FF2B5EF4-FFF2-40B4-BE49-F238E27FC236}">
+                <a16:creationId xmlns:a16="http://schemas.microsoft.com/office/drawing/2014/main" id="{8AD9A483-D05F-4D84-879D-F31D2CB2F666}"/>
+              </a:ext>
+            </a:extLst>
+          </p:cNvPr>
+          <p:cNvSpPr>
+            <a:spLocks noGrp="1"/>
+          </p:cNvSpPr>
+          <p:nvPr>
+            <p:ph type="title"/>
+          </p:nvPr>
+        </p:nvSpPr>
+        <p:spPr>
+          <a:xfrm>
+            <a:off x="838200" y="119465"/>
+            <a:ext cx="10515600" cy="562923"/>
+          </a:xfrm>
+        </p:spPr>
+        <p:txBody>
+          <a:bodyPr>
+            <a:normAutofit fontScale="90000"/>
+          </a:bodyPr>
+          <a:lstStyle/>
+          <a:p>
+            <a:pPr algn="ctr"/>
+            <a:r>
+              <a:rPr lang="en-US" dirty="0"/>
+              <a:t>List of analyzes</a:t>
+            </a:r>
+            <a:endParaRPr lang="ru-RU" dirty="0"/>
+          </a:p>
+        </p:txBody>
+      </p:sp>
+      <p:pic>
+        <p:nvPicPr>
+          <p:cNvPr id="4" name="Рисунок 3">
+            <a:extLst>
+              <a:ext uri="{FF2B5EF4-FFF2-40B4-BE49-F238E27FC236}">
+                <a16:creationId xmlns:a16="http://schemas.microsoft.com/office/drawing/2014/main" id="{CE5D7A1A-B6CE-4264-AB0B-96FA12BD204A}"/>
+              </a:ext>
+            </a:extLst>
+          </p:cNvPr>
+          <p:cNvPicPr>
+            <a:picLocks noChangeAspect="1"/>
+          </p:cNvPicPr>
+          <p:nvPr/>
+        </p:nvPicPr>
+        <p:blipFill>
+          <a:blip r:embed="rId2"/>
+          <a:stretch>
+            <a:fillRect/>
+          </a:stretch>
+        </p:blipFill>
+        <p:spPr>
+          <a:xfrm>
+            <a:off x="1785937" y="857819"/>
+            <a:ext cx="10286260" cy="5597572"/>
+          </a:xfrm>
+          <a:prstGeom prst="rect">
+            <a:avLst/>
+          </a:prstGeom>
+        </p:spPr>
+      </p:pic>
+      <p:sp>
+        <p:nvSpPr>
+          <p:cNvPr id="5" name="Выноска: линия 4">
+            <a:extLst>
+              <a:ext uri="{FF2B5EF4-FFF2-40B4-BE49-F238E27FC236}">
+                <a16:creationId xmlns:a16="http://schemas.microsoft.com/office/drawing/2014/main" id="{B8B6B42D-DB9A-4D25-A554-FB520B42188F}"/>
+              </a:ext>
+            </a:extLst>
+          </p:cNvPr>
+          <p:cNvSpPr/>
+          <p:nvPr/>
+        </p:nvSpPr>
+        <p:spPr>
+          <a:xfrm>
+            <a:off x="109182" y="2606722"/>
+            <a:ext cx="1460311" cy="2101755"/>
+          </a:xfrm>
+          <a:prstGeom prst="borderCallout1">
+            <a:avLst>
+              <a:gd name="adj1" fmla="val 36574"/>
+              <a:gd name="adj2" fmla="val 108210"/>
+              <a:gd name="adj3" fmla="val -12445"/>
+              <a:gd name="adj4" fmla="val 212775"/>
+            </a:avLst>
+          </a:prstGeom>
+        </p:spPr>
+        <p:style>
+          <a:lnRef idx="2">
+            <a:schemeClr val="accent1">
+              <a:shade val="50000"/>
+            </a:schemeClr>
+          </a:lnRef>
+          <a:fillRef idx="1">
+            <a:schemeClr val="accent1"/>
+          </a:fillRef>
+          <a:effectRef idx="0">
+            <a:schemeClr val="accent1"/>
+          </a:effectRef>
+          <a:fontRef idx="minor">
+            <a:schemeClr val="lt1"/>
+          </a:fontRef>
+        </p:style>
+        <p:txBody>
+          <a:bodyPr rtlCol="0" anchor="ctr"/>
+          <a:lstStyle/>
+          <a:p>
+            <a:pPr algn="ctr"/>
+            <a:r>
+              <a:rPr lang="en-US" dirty="0"/>
+              <a:t>Click here for more information.</a:t>
+            </a:r>
+            <a:endParaRPr lang="ru-RU" dirty="0"/>
+          </a:p>
+        </p:txBody>
+      </p:sp>
+    </p:spTree>
+    <p:extLst>
+      <p:ext uri="{BB962C8B-B14F-4D97-AF65-F5344CB8AC3E}">
+        <p14:creationId xmlns:p14="http://schemas.microsoft.com/office/powerpoint/2010/main" val="843220251"/>
+      </p:ext>
+    </p:extLst>
+  </p:cSld>
+  <p:clrMapOvr>
+    <a:masterClrMapping/>
+  </p:clrMapOvr>
+</p:sld>
+</file>
+
+<file path=ppt/slides/slide9.xml><?xml version="1.0" encoding="utf-8"?>
+<p:sld xmlns:a="http://schemas.openxmlformats.org/drawingml/2006/main" xmlns:r="http://schemas.openxmlformats.org/officeDocument/2006/relationships" xmlns:p="http://schemas.openxmlformats.org/presentationml/2006/main">
+  <p:cSld>
+    <p:spTree>
+      <p:nvGrpSpPr>
+        <p:cNvPr id="1" name=""/>
+        <p:cNvGrpSpPr/>
+        <p:nvPr/>
+      </p:nvGrpSpPr>
+      <p:grpSpPr>
+        <a:xfrm>
+          <a:off x="0" y="0"/>
+          <a:ext cx="0" cy="0"/>
+          <a:chOff x="0" y="0"/>
+          <a:chExt cx="0" cy="0"/>
+        </a:xfrm>
+      </p:grpSpPr>
+      <p:sp>
+        <p:nvSpPr>
+          <p:cNvPr id="2" name="Заголовок 1">
+            <a:extLst>
+              <a:ext uri="{FF2B5EF4-FFF2-40B4-BE49-F238E27FC236}">
+                <a16:creationId xmlns:a16="http://schemas.microsoft.com/office/drawing/2014/main" id="{042660C3-019C-4088-9D4A-88559360F968}"/>
+              </a:ext>
+            </a:extLst>
+          </p:cNvPr>
+          <p:cNvSpPr>
+            <a:spLocks noGrp="1"/>
+          </p:cNvSpPr>
+          <p:nvPr>
+            <p:ph type="title"/>
+          </p:nvPr>
+        </p:nvSpPr>
+        <p:spPr>
+          <a:xfrm>
+            <a:off x="838200" y="160410"/>
+            <a:ext cx="10515600" cy="494684"/>
+          </a:xfrm>
+        </p:spPr>
+        <p:txBody>
+          <a:bodyPr>
+            <a:normAutofit fontScale="90000"/>
+          </a:bodyPr>
+          <a:lstStyle/>
+          <a:p>
+            <a:pPr algn="ctr"/>
+            <a:r>
+              <a:rPr lang="en-US" dirty="0"/>
+              <a:t>Analysis Details</a:t>
+            </a:r>
+            <a:endParaRPr lang="ru-RU" dirty="0"/>
+          </a:p>
+        </p:txBody>
+      </p:sp>
+      <p:sp>
+        <p:nvSpPr>
+          <p:cNvPr id="5" name="Прямоугольник: скругленные углы 4">
+            <a:extLst>
+              <a:ext uri="{FF2B5EF4-FFF2-40B4-BE49-F238E27FC236}">
+                <a16:creationId xmlns:a16="http://schemas.microsoft.com/office/drawing/2014/main" id="{9E81AEA4-45B9-405D-BEA0-4823304D6C70}"/>
+              </a:ext>
+            </a:extLst>
+          </p:cNvPr>
+          <p:cNvSpPr/>
+          <p:nvPr/>
+        </p:nvSpPr>
+        <p:spPr>
+          <a:xfrm>
+            <a:off x="420297" y="6048410"/>
+            <a:ext cx="11351405" cy="709683"/>
+          </a:xfrm>
+          <a:prstGeom prst="roundRect">
+            <a:avLst/>
+          </a:prstGeom>
+        </p:spPr>
+        <p:style>
+          <a:lnRef idx="2">
+            <a:schemeClr val="accent1">
+              <a:shade val="50000"/>
+            </a:schemeClr>
+          </a:lnRef>
+          <a:fillRef idx="1">
+            <a:schemeClr val="accent1"/>
+          </a:fillRef>
+          <a:effectRef idx="0">
+            <a:schemeClr val="accent1"/>
+          </a:effectRef>
+          <a:fontRef idx="minor">
+            <a:schemeClr val="lt1"/>
+          </a:fontRef>
+        </p:style>
+        <p:txBody>
+          <a:bodyPr rtlCol="0" anchor="ctr"/>
+          <a:lstStyle/>
+          <a:p>
+            <a:pPr algn="ctr"/>
+            <a:r>
+              <a:rPr lang="en-US" dirty="0"/>
+              <a:t>The doctor will review the client's analysis and give him / her instructions and recommendations as needed. Here will be a button to add a recommendation.</a:t>
+            </a:r>
+            <a:endParaRPr lang="ru-RU" dirty="0"/>
+          </a:p>
+        </p:txBody>
+      </p:sp>
+      <p:pic>
+        <p:nvPicPr>
+          <p:cNvPr id="4" name="Рисунок 3">
+            <a:extLst>
+              <a:ext uri="{FF2B5EF4-FFF2-40B4-BE49-F238E27FC236}">
+                <a16:creationId xmlns:a16="http://schemas.microsoft.com/office/drawing/2014/main" id="{AFC77155-1F4C-427A-8BE0-EE4C896C337D}"/>
+              </a:ext>
+            </a:extLst>
+          </p:cNvPr>
+          <p:cNvPicPr>
+            <a:picLocks noChangeAspect="1"/>
+          </p:cNvPicPr>
+          <p:nvPr/>
+        </p:nvPicPr>
+        <p:blipFill>
+          <a:blip r:embed="rId2"/>
+          <a:stretch>
+            <a:fillRect/>
+          </a:stretch>
+        </p:blipFill>
+        <p:spPr>
+          <a:xfrm>
+            <a:off x="936505" y="655094"/>
+            <a:ext cx="10318987" cy="5275764"/>
+          </a:xfrm>
+          <a:prstGeom prst="rect">
+            <a:avLst/>
+          </a:prstGeom>
+        </p:spPr>
+      </p:pic>
+    </p:spTree>
+    <p:extLst>
+      <p:ext uri="{BB962C8B-B14F-4D97-AF65-F5344CB8AC3E}">
+        <p14:creationId xmlns:p14="http://schemas.microsoft.com/office/powerpoint/2010/main" val="47480272"/>
       </p:ext>
     </p:extLst>
   </p:cSld>

</xml_diff>

<commit_message>
Update mkarta.uz Technical requirement presentation - eng.pptx
</commit_message>
<xml_diff>
--- a/Presentation/mkarta.uz Technical requirement presentation - eng.pptx
+++ b/Presentation/mkarta.uz Technical requirement presentation - eng.pptx
@@ -3354,17 +3354,19 @@
         </p:nvSpPr>
         <p:spPr>
           <a:xfrm>
-            <a:off x="1524000" y="628721"/>
-            <a:ext cx="9144000" cy="971479"/>
+            <a:off x="736979" y="628721"/>
+            <a:ext cx="10686197" cy="971479"/>
           </a:xfrm>
         </p:spPr>
         <p:txBody>
-          <a:bodyPr/>
+          <a:bodyPr>
+            <a:normAutofit fontScale="90000"/>
+          </a:bodyPr>
           <a:lstStyle/>
           <a:p>
             <a:r>
               <a:rPr lang="en-US" dirty="0"/>
-              <a:t>mkarta.uz</a:t>
+              <a:t>mkarta.uz a medical record web site</a:t>
             </a:r>
             <a:endParaRPr lang="ru-RU" dirty="0"/>
           </a:p>

</xml_diff>

<commit_message>
temp image folder changed
</commit_message>
<xml_diff>
--- a/Presentation/mkarta.uz Technical requirement presentation - eng.pptx
+++ b/Presentation/mkarta.uz Technical requirement presentation - eng.pptx
@@ -269,7 +269,7 @@
           <a:p>
             <a:fld id="{055FAE5C-355E-4A36-84AB-9279FAA04DDD}" type="datetimeFigureOut">
               <a:rPr lang="ru-RU" smtClean="0"/>
-              <a:t>20.02.2020</a:t>
+              <a:t>21.02.2020</a:t>
             </a:fld>
             <a:endParaRPr lang="ru-RU"/>
           </a:p>
@@ -467,7 +467,7 @@
           <a:p>
             <a:fld id="{055FAE5C-355E-4A36-84AB-9279FAA04DDD}" type="datetimeFigureOut">
               <a:rPr lang="ru-RU" smtClean="0"/>
-              <a:t>20.02.2020</a:t>
+              <a:t>21.02.2020</a:t>
             </a:fld>
             <a:endParaRPr lang="ru-RU"/>
           </a:p>
@@ -675,7 +675,7 @@
           <a:p>
             <a:fld id="{055FAE5C-355E-4A36-84AB-9279FAA04DDD}" type="datetimeFigureOut">
               <a:rPr lang="ru-RU" smtClean="0"/>
-              <a:t>20.02.2020</a:t>
+              <a:t>21.02.2020</a:t>
             </a:fld>
             <a:endParaRPr lang="ru-RU"/>
           </a:p>
@@ -873,7 +873,7 @@
           <a:p>
             <a:fld id="{055FAE5C-355E-4A36-84AB-9279FAA04DDD}" type="datetimeFigureOut">
               <a:rPr lang="ru-RU" smtClean="0"/>
-              <a:t>20.02.2020</a:t>
+              <a:t>21.02.2020</a:t>
             </a:fld>
             <a:endParaRPr lang="ru-RU"/>
           </a:p>
@@ -1148,7 +1148,7 @@
           <a:p>
             <a:fld id="{055FAE5C-355E-4A36-84AB-9279FAA04DDD}" type="datetimeFigureOut">
               <a:rPr lang="ru-RU" smtClean="0"/>
-              <a:t>20.02.2020</a:t>
+              <a:t>21.02.2020</a:t>
             </a:fld>
             <a:endParaRPr lang="ru-RU"/>
           </a:p>
@@ -1413,7 +1413,7 @@
           <a:p>
             <a:fld id="{055FAE5C-355E-4A36-84AB-9279FAA04DDD}" type="datetimeFigureOut">
               <a:rPr lang="ru-RU" smtClean="0"/>
-              <a:t>20.02.2020</a:t>
+              <a:t>21.02.2020</a:t>
             </a:fld>
             <a:endParaRPr lang="ru-RU"/>
           </a:p>
@@ -1825,7 +1825,7 @@
           <a:p>
             <a:fld id="{055FAE5C-355E-4A36-84AB-9279FAA04DDD}" type="datetimeFigureOut">
               <a:rPr lang="ru-RU" smtClean="0"/>
-              <a:t>20.02.2020</a:t>
+              <a:t>21.02.2020</a:t>
             </a:fld>
             <a:endParaRPr lang="ru-RU"/>
           </a:p>
@@ -1966,7 +1966,7 @@
           <a:p>
             <a:fld id="{055FAE5C-355E-4A36-84AB-9279FAA04DDD}" type="datetimeFigureOut">
               <a:rPr lang="ru-RU" smtClean="0"/>
-              <a:t>20.02.2020</a:t>
+              <a:t>21.02.2020</a:t>
             </a:fld>
             <a:endParaRPr lang="ru-RU"/>
           </a:p>
@@ -2079,7 +2079,7 @@
           <a:p>
             <a:fld id="{055FAE5C-355E-4A36-84AB-9279FAA04DDD}" type="datetimeFigureOut">
               <a:rPr lang="ru-RU" smtClean="0"/>
-              <a:t>20.02.2020</a:t>
+              <a:t>21.02.2020</a:t>
             </a:fld>
             <a:endParaRPr lang="ru-RU"/>
           </a:p>
@@ -2390,7 +2390,7 @@
           <a:p>
             <a:fld id="{055FAE5C-355E-4A36-84AB-9279FAA04DDD}" type="datetimeFigureOut">
               <a:rPr lang="ru-RU" smtClean="0"/>
-              <a:t>20.02.2020</a:t>
+              <a:t>21.02.2020</a:t>
             </a:fld>
             <a:endParaRPr lang="ru-RU"/>
           </a:p>
@@ -2678,7 +2678,7 @@
           <a:p>
             <a:fld id="{055FAE5C-355E-4A36-84AB-9279FAA04DDD}" type="datetimeFigureOut">
               <a:rPr lang="ru-RU" smtClean="0"/>
-              <a:t>20.02.2020</a:t>
+              <a:t>21.02.2020</a:t>
             </a:fld>
             <a:endParaRPr lang="ru-RU"/>
           </a:p>
@@ -2919,7 +2919,7 @@
           <a:p>
             <a:fld id="{055FAE5C-355E-4A36-84AB-9279FAA04DDD}" type="datetimeFigureOut">
               <a:rPr lang="ru-RU" smtClean="0"/>
-              <a:t>20.02.2020</a:t>
+              <a:t>21.02.2020</a:t>
             </a:fld>
             <a:endParaRPr lang="ru-RU"/>
           </a:p>
@@ -4023,19 +4023,19 @@
           <a:p>
             <a:r>
               <a:rPr lang="en-US" dirty="0"/>
-              <a:t>Keep user health information, diagnostic answers, treatment recommendations in one place;</a:t>
+              <a:t>Keep user’s health information, diagnostic answers, treatment recommendations in one place;</a:t>
             </a:r>
           </a:p>
           <a:p>
             <a:r>
               <a:rPr lang="en-US" dirty="0"/>
-              <a:t>Allows doctors to give advice on treatment or improving health;</a:t>
+              <a:t>Allows doctors to give advices on treatment or improving health;</a:t>
             </a:r>
           </a:p>
           <a:p>
             <a:r>
               <a:rPr lang="en-US" dirty="0"/>
-              <a:t>Prepare reports on user health changes over time.</a:t>
+              <a:t>Prepare reports on user’s health changes over time.</a:t>
             </a:r>
             <a:endParaRPr lang="ru-RU" dirty="0"/>
           </a:p>
@@ -4095,7 +4095,7 @@
             <a:pPr algn="ctr"/>
             <a:r>
               <a:rPr lang="en-US" b="1" dirty="0"/>
-              <a:t>Information about software and hosting mkarta.uz</a:t>
+              <a:t>Software and hosting information</a:t>
             </a:r>
             <a:endParaRPr lang="ru-RU" b="1" dirty="0"/>
           </a:p>
@@ -4144,7 +4144,7 @@
           <a:p>
             <a:r>
               <a:rPr lang="en-US" dirty="0"/>
-              <a:t>Hosting service from hostinger.com.</a:t>
+              <a:t>Hosting service is from hostinger.com.</a:t>
             </a:r>
             <a:endParaRPr lang="uz-Cyrl-UZ" dirty="0"/>
           </a:p>
@@ -4233,13 +4233,13 @@
           <a:p>
             <a:r>
               <a:rPr lang="en-US" dirty="0"/>
-              <a:t>User data is accessible only to the user and the doctors. Not visible to other users.</a:t>
+              <a:t>User’s data is accessible only to the user and the doctors. Not visible to other users.</a:t>
             </a:r>
           </a:p>
           <a:p>
             <a:r>
               <a:rPr lang="en-US" dirty="0"/>
-              <a:t>User’s can be added into the group of doctors only on the basis of the submitted documents.</a:t>
+              <a:t>Users can be added into the group of doctors only on the basis of the submitted documents.</a:t>
             </a:r>
             <a:endParaRPr lang="ru-RU" dirty="0"/>
           </a:p>

</xml_diff>